<commit_message>
update presentation to v2
</commit_message>
<xml_diff>
--- a/COVID-19 Diagnosis.pptx
+++ b/COVID-19 Diagnosis.pptx
@@ -5,7 +5,7 @@
     <p:sldMasterId id="2147483660" r:id="rId1"/>
   </p:sldMasterIdLst>
   <p:notesMasterIdLst>
-    <p:notesMasterId r:id="rId16"/>
+    <p:notesMasterId r:id="rId17"/>
   </p:notesMasterIdLst>
   <p:sldIdLst>
     <p:sldId id="256" r:id="rId2"/>
@@ -20,8 +20,9 @@
     <p:sldId id="268" r:id="rId11"/>
     <p:sldId id="266" r:id="rId12"/>
     <p:sldId id="267" r:id="rId13"/>
-    <p:sldId id="269" r:id="rId14"/>
-    <p:sldId id="270" r:id="rId15"/>
+    <p:sldId id="271" r:id="rId14"/>
+    <p:sldId id="269" r:id="rId15"/>
+    <p:sldId id="270" r:id="rId16"/>
   </p:sldIdLst>
   <p:sldSz cx="12192000" cy="6858000"/>
   <p:notesSz cx="6858000" cy="9144000"/>
@@ -120,6 +121,11 @@
       </a:defRPr>
     </a:lvl9pPr>
   </p:defaultTextStyle>
+  <p:extLst>
+    <p:ext uri="{EFAFB233-063F-42B5-8137-9DF3F51BA10A}">
+      <p15:sldGuideLst xmlns:p15="http://schemas.microsoft.com/office/powerpoint/2012/main"/>
+    </p:ext>
+  </p:extLst>
 </p:presentation>
 </file>
 
@@ -8083,13 +8089,13 @@
   <p:clrMapOvr>
     <a:overrideClrMapping bg1="lt1" tx1="dk1" bg2="lt2" tx2="dk2" accent1="accent1" accent2="accent2" accent3="accent3" accent4="accent4" accent5="accent5" accent6="accent6" hlink="hlink" folHlink="folHlink"/>
   </p:clrMapOvr>
-  <mc:AlternateContent xmlns:mc="http://schemas.openxmlformats.org/markup-compatibility/2006">
-    <mc:Choice xmlns:p14="http://schemas.microsoft.com/office/powerpoint/2010/main" Requires="p14">
+  <mc:AlternateContent xmlns:mc="http://schemas.openxmlformats.org/markup-compatibility/2006" xmlns:p14="http://schemas.microsoft.com/office/powerpoint/2010/main">
+    <mc:Choice Requires="p14">
       <p:transition spd="med" p14:dur="700">
         <p:fade/>
       </p:transition>
     </mc:Choice>
-    <mc:Fallback>
+    <mc:Fallback xmlns="">
       <p:transition spd="med">
         <p:fade/>
       </p:transition>
@@ -8317,11 +8323,13 @@
         <p:spPr>
           <a:xfrm>
             <a:off x="422564" y="5549281"/>
-            <a:ext cx="2505364" cy="953119"/>
+            <a:ext cx="2791416" cy="953119"/>
           </a:xfrm>
         </p:spPr>
         <p:txBody>
-          <a:bodyPr/>
+          <a:bodyPr>
+            <a:normAutofit/>
+          </a:bodyPr>
           <a:lstStyle/>
           <a:p>
             <a:pPr marL="0" indent="0">
@@ -8329,7 +8337,7 @@
             </a:pPr>
             <a:r>
               <a:rPr lang="en-US" dirty="0"/>
-              <a:t>Train accuracy: 0.9752 </a:t>
+              <a:t>Train accuracy: 0.9752% </a:t>
             </a:r>
           </a:p>
           <a:p>
@@ -8338,7 +8346,7 @@
             </a:pPr>
             <a:r>
               <a:rPr lang="en-US" dirty="0"/>
-              <a:t>Test accuracy: 0.9621</a:t>
+              <a:t>Test accuracy: 0.9621%</a:t>
             </a:r>
           </a:p>
         </p:txBody>
@@ -8652,8 +8660,8 @@
         </p:nvCxnSpPr>
         <p:spPr>
           <a:xfrm flipH="1">
-            <a:off x="1675246" y="4716855"/>
-            <a:ext cx="1665483" cy="832426"/>
+            <a:off x="1818272" y="4716855"/>
+            <a:ext cx="1522457" cy="832426"/>
           </a:xfrm>
           <a:prstGeom prst="straightConnector1">
             <a:avLst/>
@@ -8677,459 +8685,6 @@
           </a:fontRef>
         </p:style>
       </p:cxnSp>
-      <p:sp>
-        <p:nvSpPr>
-          <p:cNvPr id="5" name="Content Placeholder 2">
-            <a:extLst>
-              <a:ext uri="{FF2B5EF4-FFF2-40B4-BE49-F238E27FC236}">
-                <a16:creationId xmlns:a16="http://schemas.microsoft.com/office/drawing/2014/main" id="{12523323-31F3-05CA-3098-A582290EF15B}"/>
-              </a:ext>
-            </a:extLst>
-          </p:cNvPr>
-          <p:cNvSpPr txBox="1">
-            <a:spLocks/>
-          </p:cNvSpPr>
-          <p:nvPr/>
-        </p:nvSpPr>
-        <p:spPr>
-          <a:xfrm>
-            <a:off x="332857" y="3639268"/>
-            <a:ext cx="2175485" cy="1258408"/>
-          </a:xfrm>
-          <a:prstGeom prst="rect">
-            <a:avLst/>
-          </a:prstGeom>
-        </p:spPr>
-        <p:txBody>
-          <a:bodyPr vert="horz" lIns="91440" tIns="45720" rIns="91440" bIns="45720" rtlCol="0">
-            <a:normAutofit fontScale="85000" lnSpcReduction="10000"/>
-          </a:bodyPr>
-          <a:lstStyle>
-            <a:lvl1pPr marL="228600" indent="-228600" algn="l" defTabSz="914400" rtl="0" eaLnBrk="1" latinLnBrk="0" hangingPunct="1">
-              <a:lnSpc>
-                <a:spcPct val="110000"/>
-              </a:lnSpc>
-              <a:spcBef>
-                <a:spcPts val="1000"/>
-              </a:spcBef>
-              <a:buSzPct val="80000"/>
-              <a:buFont typeface="Arial" panose="020B0604020202020204" pitchFamily="34" charset="0"/>
-              <a:buChar char="•"/>
-              <a:defRPr sz="2000" kern="1200">
-                <a:solidFill>
-                  <a:schemeClr val="tx1"/>
-                </a:solidFill>
-                <a:latin typeface="+mn-lt"/>
-                <a:ea typeface="+mn-ea"/>
-                <a:cs typeface="+mn-cs"/>
-              </a:defRPr>
-            </a:lvl1pPr>
-            <a:lvl2pPr marL="502920" indent="-228600" algn="l" defTabSz="914400" rtl="0" eaLnBrk="1" latinLnBrk="0" hangingPunct="1">
-              <a:lnSpc>
-                <a:spcPct val="110000"/>
-              </a:lnSpc>
-              <a:spcBef>
-                <a:spcPts val="500"/>
-              </a:spcBef>
-              <a:buSzPct val="80000"/>
-              <a:buFont typeface="Goudy Old Style" panose="02020502050305020303" pitchFamily="18" charset="0"/>
-              <a:buChar char="–"/>
-              <a:defRPr sz="1800" i="1" kern="1200">
-                <a:solidFill>
-                  <a:schemeClr val="tx1"/>
-                </a:solidFill>
-                <a:latin typeface="+mn-lt"/>
-                <a:ea typeface="+mn-ea"/>
-                <a:cs typeface="+mn-cs"/>
-              </a:defRPr>
-            </a:lvl2pPr>
-            <a:lvl3pPr marL="822960" indent="-228600" algn="l" defTabSz="914400" rtl="0" eaLnBrk="1" latinLnBrk="0" hangingPunct="1">
-              <a:lnSpc>
-                <a:spcPct val="110000"/>
-              </a:lnSpc>
-              <a:spcBef>
-                <a:spcPts val="500"/>
-              </a:spcBef>
-              <a:buSzPct val="80000"/>
-              <a:buFont typeface="Arial" panose="020B0604020202020204" pitchFamily="34" charset="0"/>
-              <a:buChar char="•"/>
-              <a:defRPr sz="1600" kern="1200">
-                <a:solidFill>
-                  <a:schemeClr val="tx1"/>
-                </a:solidFill>
-                <a:latin typeface="+mn-lt"/>
-                <a:ea typeface="+mn-ea"/>
-                <a:cs typeface="+mn-cs"/>
-              </a:defRPr>
-            </a:lvl3pPr>
-            <a:lvl4pPr marL="1097280" indent="-228600" algn="l" defTabSz="914400" rtl="0" eaLnBrk="1" latinLnBrk="0" hangingPunct="1">
-              <a:lnSpc>
-                <a:spcPct val="110000"/>
-              </a:lnSpc>
-              <a:spcBef>
-                <a:spcPts val="500"/>
-              </a:spcBef>
-              <a:buSzPct val="80000"/>
-              <a:buFont typeface="Goudy Old Style" panose="02020502050305020303" pitchFamily="18" charset="0"/>
-              <a:buChar char="–"/>
-              <a:defRPr sz="1400" i="1" kern="1200">
-                <a:solidFill>
-                  <a:schemeClr val="tx1"/>
-                </a:solidFill>
-                <a:latin typeface="+mn-lt"/>
-                <a:ea typeface="+mn-ea"/>
-                <a:cs typeface="+mn-cs"/>
-              </a:defRPr>
-            </a:lvl4pPr>
-            <a:lvl5pPr marL="1371600" indent="-228600" algn="l" defTabSz="914400" rtl="0" eaLnBrk="1" latinLnBrk="0" hangingPunct="1">
-              <a:lnSpc>
-                <a:spcPct val="110000"/>
-              </a:lnSpc>
-              <a:spcBef>
-                <a:spcPts val="500"/>
-              </a:spcBef>
-              <a:buSzPct val="80000"/>
-              <a:buFont typeface="Arial" panose="020B0604020202020204" pitchFamily="34" charset="0"/>
-              <a:buChar char="•"/>
-              <a:defRPr sz="1400" kern="1200">
-                <a:solidFill>
-                  <a:schemeClr val="tx1"/>
-                </a:solidFill>
-                <a:latin typeface="+mn-lt"/>
-                <a:ea typeface="+mn-ea"/>
-                <a:cs typeface="+mn-cs"/>
-              </a:defRPr>
-            </a:lvl5pPr>
-            <a:lvl6pPr marL="2514600" indent="-228600" algn="l" defTabSz="914400" rtl="0" eaLnBrk="1" latinLnBrk="0" hangingPunct="1">
-              <a:lnSpc>
-                <a:spcPct val="90000"/>
-              </a:lnSpc>
-              <a:spcBef>
-                <a:spcPts val="500"/>
-              </a:spcBef>
-              <a:buFont typeface="Arial" panose="020B0604020202020204" pitchFamily="34" charset="0"/>
-              <a:buChar char="•"/>
-              <a:defRPr sz="1800" kern="1200">
-                <a:solidFill>
-                  <a:schemeClr val="tx1"/>
-                </a:solidFill>
-                <a:latin typeface="+mn-lt"/>
-                <a:ea typeface="+mn-ea"/>
-                <a:cs typeface="+mn-cs"/>
-              </a:defRPr>
-            </a:lvl6pPr>
-            <a:lvl7pPr marL="2971800" indent="-228600" algn="l" defTabSz="914400" rtl="0" eaLnBrk="1" latinLnBrk="0" hangingPunct="1">
-              <a:lnSpc>
-                <a:spcPct val="90000"/>
-              </a:lnSpc>
-              <a:spcBef>
-                <a:spcPts val="500"/>
-              </a:spcBef>
-              <a:buFont typeface="Arial" panose="020B0604020202020204" pitchFamily="34" charset="0"/>
-              <a:buChar char="•"/>
-              <a:defRPr sz="1800" kern="1200">
-                <a:solidFill>
-                  <a:schemeClr val="tx1"/>
-                </a:solidFill>
-                <a:latin typeface="+mn-lt"/>
-                <a:ea typeface="+mn-ea"/>
-                <a:cs typeface="+mn-cs"/>
-              </a:defRPr>
-            </a:lvl7pPr>
-            <a:lvl8pPr marL="3429000" indent="-228600" algn="l" defTabSz="914400" rtl="0" eaLnBrk="1" latinLnBrk="0" hangingPunct="1">
-              <a:lnSpc>
-                <a:spcPct val="90000"/>
-              </a:lnSpc>
-              <a:spcBef>
-                <a:spcPts val="500"/>
-              </a:spcBef>
-              <a:buFont typeface="Arial" panose="020B0604020202020204" pitchFamily="34" charset="0"/>
-              <a:buChar char="•"/>
-              <a:defRPr sz="1800" kern="1200">
-                <a:solidFill>
-                  <a:schemeClr val="tx1"/>
-                </a:solidFill>
-                <a:latin typeface="+mn-lt"/>
-                <a:ea typeface="+mn-ea"/>
-                <a:cs typeface="+mn-cs"/>
-              </a:defRPr>
-            </a:lvl8pPr>
-            <a:lvl9pPr marL="3886200" indent="-228600" algn="l" defTabSz="914400" rtl="0" eaLnBrk="1" latinLnBrk="0" hangingPunct="1">
-              <a:lnSpc>
-                <a:spcPct val="90000"/>
-              </a:lnSpc>
-              <a:spcBef>
-                <a:spcPts val="500"/>
-              </a:spcBef>
-              <a:buFont typeface="Arial" panose="020B0604020202020204" pitchFamily="34" charset="0"/>
-              <a:buChar char="•"/>
-              <a:defRPr sz="1800" kern="1200">
-                <a:solidFill>
-                  <a:schemeClr val="tx1"/>
-                </a:solidFill>
-                <a:latin typeface="+mn-lt"/>
-                <a:ea typeface="+mn-ea"/>
-                <a:cs typeface="+mn-cs"/>
-              </a:defRPr>
-            </a:lvl9pPr>
-          </a:lstStyle>
-          <a:p>
-            <a:pPr marL="0" indent="0">
-              <a:buFont typeface="Arial" panose="020B0604020202020204" pitchFamily="34" charset="0"/>
-              <a:buNone/>
-            </a:pPr>
-            <a:r>
-              <a:rPr lang="en-US" dirty="0"/>
-              <a:t>CNN</a:t>
-            </a:r>
-          </a:p>
-          <a:p>
-            <a:pPr marL="0" indent="0">
-              <a:buFont typeface="Arial" panose="020B0604020202020204" pitchFamily="34" charset="0"/>
-              <a:buNone/>
-            </a:pPr>
-            <a:r>
-              <a:rPr lang="en-US" dirty="0"/>
-              <a:t>Train accuracy: 0.9120 </a:t>
-            </a:r>
-          </a:p>
-          <a:p>
-            <a:pPr marL="0" indent="0">
-              <a:buFont typeface="Arial" panose="020B0604020202020204" pitchFamily="34" charset="0"/>
-              <a:buNone/>
-            </a:pPr>
-            <a:r>
-              <a:rPr lang="en-US" dirty="0"/>
-              <a:t>Test accuracy: 0.8907</a:t>
-            </a:r>
-          </a:p>
-        </p:txBody>
-      </p:sp>
-      <p:sp>
-        <p:nvSpPr>
-          <p:cNvPr id="6" name="Content Placeholder 2">
-            <a:extLst>
-              <a:ext uri="{FF2B5EF4-FFF2-40B4-BE49-F238E27FC236}">
-                <a16:creationId xmlns:a16="http://schemas.microsoft.com/office/drawing/2014/main" id="{AA1DB0C5-3A19-B95E-620F-06DBB9617FD3}"/>
-              </a:ext>
-            </a:extLst>
-          </p:cNvPr>
-          <p:cNvSpPr txBox="1">
-            <a:spLocks/>
-          </p:cNvSpPr>
-          <p:nvPr/>
-        </p:nvSpPr>
-        <p:spPr>
-          <a:xfrm>
-            <a:off x="9885027" y="3553940"/>
-            <a:ext cx="1983702" cy="1461679"/>
-          </a:xfrm>
-          <a:prstGeom prst="rect">
-            <a:avLst/>
-          </a:prstGeom>
-        </p:spPr>
-        <p:txBody>
-          <a:bodyPr vert="horz" lIns="91440" tIns="45720" rIns="91440" bIns="45720" rtlCol="0">
-            <a:normAutofit/>
-          </a:bodyPr>
-          <a:lstStyle>
-            <a:lvl1pPr marL="228600" indent="-228600" algn="l" defTabSz="914400" rtl="0" eaLnBrk="1" latinLnBrk="0" hangingPunct="1">
-              <a:lnSpc>
-                <a:spcPct val="110000"/>
-              </a:lnSpc>
-              <a:spcBef>
-                <a:spcPts val="1000"/>
-              </a:spcBef>
-              <a:buSzPct val="80000"/>
-              <a:buFont typeface="Arial" panose="020B0604020202020204" pitchFamily="34" charset="0"/>
-              <a:buChar char="•"/>
-              <a:defRPr sz="2000" kern="1200">
-                <a:solidFill>
-                  <a:schemeClr val="tx1"/>
-                </a:solidFill>
-                <a:latin typeface="+mn-lt"/>
-                <a:ea typeface="+mn-ea"/>
-                <a:cs typeface="+mn-cs"/>
-              </a:defRPr>
-            </a:lvl1pPr>
-            <a:lvl2pPr marL="502920" indent="-228600" algn="l" defTabSz="914400" rtl="0" eaLnBrk="1" latinLnBrk="0" hangingPunct="1">
-              <a:lnSpc>
-                <a:spcPct val="110000"/>
-              </a:lnSpc>
-              <a:spcBef>
-                <a:spcPts val="500"/>
-              </a:spcBef>
-              <a:buSzPct val="80000"/>
-              <a:buFont typeface="Goudy Old Style" panose="02020502050305020303" pitchFamily="18" charset="0"/>
-              <a:buChar char="–"/>
-              <a:defRPr sz="1800" i="1" kern="1200">
-                <a:solidFill>
-                  <a:schemeClr val="tx1"/>
-                </a:solidFill>
-                <a:latin typeface="+mn-lt"/>
-                <a:ea typeface="+mn-ea"/>
-                <a:cs typeface="+mn-cs"/>
-              </a:defRPr>
-            </a:lvl2pPr>
-            <a:lvl3pPr marL="822960" indent="-228600" algn="l" defTabSz="914400" rtl="0" eaLnBrk="1" latinLnBrk="0" hangingPunct="1">
-              <a:lnSpc>
-                <a:spcPct val="110000"/>
-              </a:lnSpc>
-              <a:spcBef>
-                <a:spcPts val="500"/>
-              </a:spcBef>
-              <a:buSzPct val="80000"/>
-              <a:buFont typeface="Arial" panose="020B0604020202020204" pitchFamily="34" charset="0"/>
-              <a:buChar char="•"/>
-              <a:defRPr sz="1600" kern="1200">
-                <a:solidFill>
-                  <a:schemeClr val="tx1"/>
-                </a:solidFill>
-                <a:latin typeface="+mn-lt"/>
-                <a:ea typeface="+mn-ea"/>
-                <a:cs typeface="+mn-cs"/>
-              </a:defRPr>
-            </a:lvl3pPr>
-            <a:lvl4pPr marL="1097280" indent="-228600" algn="l" defTabSz="914400" rtl="0" eaLnBrk="1" latinLnBrk="0" hangingPunct="1">
-              <a:lnSpc>
-                <a:spcPct val="110000"/>
-              </a:lnSpc>
-              <a:spcBef>
-                <a:spcPts val="500"/>
-              </a:spcBef>
-              <a:buSzPct val="80000"/>
-              <a:buFont typeface="Goudy Old Style" panose="02020502050305020303" pitchFamily="18" charset="0"/>
-              <a:buChar char="–"/>
-              <a:defRPr sz="1400" i="1" kern="1200">
-                <a:solidFill>
-                  <a:schemeClr val="tx1"/>
-                </a:solidFill>
-                <a:latin typeface="+mn-lt"/>
-                <a:ea typeface="+mn-ea"/>
-                <a:cs typeface="+mn-cs"/>
-              </a:defRPr>
-            </a:lvl4pPr>
-            <a:lvl5pPr marL="1371600" indent="-228600" algn="l" defTabSz="914400" rtl="0" eaLnBrk="1" latinLnBrk="0" hangingPunct="1">
-              <a:lnSpc>
-                <a:spcPct val="110000"/>
-              </a:lnSpc>
-              <a:spcBef>
-                <a:spcPts val="500"/>
-              </a:spcBef>
-              <a:buSzPct val="80000"/>
-              <a:buFont typeface="Arial" panose="020B0604020202020204" pitchFamily="34" charset="0"/>
-              <a:buChar char="•"/>
-              <a:defRPr sz="1400" kern="1200">
-                <a:solidFill>
-                  <a:schemeClr val="tx1"/>
-                </a:solidFill>
-                <a:latin typeface="+mn-lt"/>
-                <a:ea typeface="+mn-ea"/>
-                <a:cs typeface="+mn-cs"/>
-              </a:defRPr>
-            </a:lvl5pPr>
-            <a:lvl6pPr marL="2514600" indent="-228600" algn="l" defTabSz="914400" rtl="0" eaLnBrk="1" latinLnBrk="0" hangingPunct="1">
-              <a:lnSpc>
-                <a:spcPct val="90000"/>
-              </a:lnSpc>
-              <a:spcBef>
-                <a:spcPts val="500"/>
-              </a:spcBef>
-              <a:buFont typeface="Arial" panose="020B0604020202020204" pitchFamily="34" charset="0"/>
-              <a:buChar char="•"/>
-              <a:defRPr sz="1800" kern="1200">
-                <a:solidFill>
-                  <a:schemeClr val="tx1"/>
-                </a:solidFill>
-                <a:latin typeface="+mn-lt"/>
-                <a:ea typeface="+mn-ea"/>
-                <a:cs typeface="+mn-cs"/>
-              </a:defRPr>
-            </a:lvl6pPr>
-            <a:lvl7pPr marL="2971800" indent="-228600" algn="l" defTabSz="914400" rtl="0" eaLnBrk="1" latinLnBrk="0" hangingPunct="1">
-              <a:lnSpc>
-                <a:spcPct val="90000"/>
-              </a:lnSpc>
-              <a:spcBef>
-                <a:spcPts val="500"/>
-              </a:spcBef>
-              <a:buFont typeface="Arial" panose="020B0604020202020204" pitchFamily="34" charset="0"/>
-              <a:buChar char="•"/>
-              <a:defRPr sz="1800" kern="1200">
-                <a:solidFill>
-                  <a:schemeClr val="tx1"/>
-                </a:solidFill>
-                <a:latin typeface="+mn-lt"/>
-                <a:ea typeface="+mn-ea"/>
-                <a:cs typeface="+mn-cs"/>
-              </a:defRPr>
-            </a:lvl7pPr>
-            <a:lvl8pPr marL="3429000" indent="-228600" algn="l" defTabSz="914400" rtl="0" eaLnBrk="1" latinLnBrk="0" hangingPunct="1">
-              <a:lnSpc>
-                <a:spcPct val="90000"/>
-              </a:lnSpc>
-              <a:spcBef>
-                <a:spcPts val="500"/>
-              </a:spcBef>
-              <a:buFont typeface="Arial" panose="020B0604020202020204" pitchFamily="34" charset="0"/>
-              <a:buChar char="•"/>
-              <a:defRPr sz="1800" kern="1200">
-                <a:solidFill>
-                  <a:schemeClr val="tx1"/>
-                </a:solidFill>
-                <a:latin typeface="+mn-lt"/>
-                <a:ea typeface="+mn-ea"/>
-                <a:cs typeface="+mn-cs"/>
-              </a:defRPr>
-            </a:lvl8pPr>
-            <a:lvl9pPr marL="3886200" indent="-228600" algn="l" defTabSz="914400" rtl="0" eaLnBrk="1" latinLnBrk="0" hangingPunct="1">
-              <a:lnSpc>
-                <a:spcPct val="90000"/>
-              </a:lnSpc>
-              <a:spcBef>
-                <a:spcPts val="500"/>
-              </a:spcBef>
-              <a:buFont typeface="Arial" panose="020B0604020202020204" pitchFamily="34" charset="0"/>
-              <a:buChar char="•"/>
-              <a:defRPr sz="1800" kern="1200">
-                <a:solidFill>
-                  <a:schemeClr val="tx1"/>
-                </a:solidFill>
-                <a:latin typeface="+mn-lt"/>
-                <a:ea typeface="+mn-ea"/>
-                <a:cs typeface="+mn-cs"/>
-              </a:defRPr>
-            </a:lvl9pPr>
-          </a:lstStyle>
-          <a:p>
-            <a:pPr marL="0" indent="0">
-              <a:buNone/>
-            </a:pPr>
-            <a:r>
-              <a:rPr lang="en-US" dirty="0"/>
-              <a:t>CNN</a:t>
-            </a:r>
-          </a:p>
-          <a:p>
-            <a:pPr marL="0" indent="0">
-              <a:buNone/>
-            </a:pPr>
-            <a:r>
-              <a:rPr lang="en-US" dirty="0"/>
-              <a:t>Train loss: 0.2787</a:t>
-            </a:r>
-          </a:p>
-          <a:p>
-            <a:pPr marL="0" indent="0">
-              <a:buNone/>
-            </a:pPr>
-            <a:r>
-              <a:rPr lang="en-US" dirty="0"/>
-              <a:t>Test loss: 0.2877</a:t>
-            </a:r>
-          </a:p>
-        </p:txBody>
-      </p:sp>
     </p:spTree>
     <p:extLst>
       <p:ext uri="{BB962C8B-B14F-4D97-AF65-F5344CB8AC3E}">
@@ -9140,13 +8695,13 @@
   <p:clrMapOvr>
     <a:overrideClrMapping bg1="lt1" tx1="dk1" bg2="lt2" tx2="dk2" accent1="accent1" accent2="accent2" accent3="accent3" accent4="accent4" accent5="accent5" accent6="accent6" hlink="hlink" folHlink="folHlink"/>
   </p:clrMapOvr>
-  <mc:AlternateContent xmlns:mc="http://schemas.openxmlformats.org/markup-compatibility/2006">
-    <mc:Choice xmlns:p14="http://schemas.microsoft.com/office/powerpoint/2010/main" Requires="p14">
+  <mc:AlternateContent xmlns:mc="http://schemas.openxmlformats.org/markup-compatibility/2006" xmlns:p14="http://schemas.microsoft.com/office/powerpoint/2010/main">
+    <mc:Choice Requires="p14">
       <p:transition spd="med" p14:dur="700">
         <p:fade/>
       </p:transition>
     </mc:Choice>
-    <mc:Fallback>
+    <mc:Fallback xmlns="">
       <p:transition spd="med">
         <p:fade/>
       </p:transition>
@@ -9387,112 +8942,6 @@
                       </p:childTnLst>
                     </p:cTn>
                   </p:par>
-                  <p:par>
-                    <p:cTn id="22" fill="hold">
-                      <p:stCondLst>
-                        <p:cond delay="indefinite"/>
-                      </p:stCondLst>
-                      <p:childTnLst>
-                        <p:par>
-                          <p:cTn id="23" fill="hold">
-                            <p:stCondLst>
-                              <p:cond delay="0"/>
-                            </p:stCondLst>
-                            <p:childTnLst>
-                              <p:par>
-                                <p:cTn id="24" presetID="10" presetClass="entr" presetSubtype="0" fill="hold" grpId="0" nodeType="clickEffect">
-                                  <p:stCondLst>
-                                    <p:cond delay="0"/>
-                                  </p:stCondLst>
-                                  <p:childTnLst>
-                                    <p:set>
-                                      <p:cBhvr>
-                                        <p:cTn id="25" dur="1" fill="hold">
-                                          <p:stCondLst>
-                                            <p:cond delay="0"/>
-                                          </p:stCondLst>
-                                        </p:cTn>
-                                        <p:tgtEl>
-                                          <p:spTgt spid="5"/>
-                                        </p:tgtEl>
-                                        <p:attrNameLst>
-                                          <p:attrName>style.visibility</p:attrName>
-                                        </p:attrNameLst>
-                                      </p:cBhvr>
-                                      <p:to>
-                                        <p:strVal val="visible"/>
-                                      </p:to>
-                                    </p:set>
-                                    <p:animEffect transition="in" filter="fade">
-                                      <p:cBhvr>
-                                        <p:cTn id="26" dur="500"/>
-                                        <p:tgtEl>
-                                          <p:spTgt spid="5"/>
-                                        </p:tgtEl>
-                                      </p:cBhvr>
-                                    </p:animEffect>
-                                  </p:childTnLst>
-                                </p:cTn>
-                              </p:par>
-                            </p:childTnLst>
-                          </p:cTn>
-                        </p:par>
-                      </p:childTnLst>
-                    </p:cTn>
-                  </p:par>
-                  <p:par>
-                    <p:cTn id="27" fill="hold">
-                      <p:stCondLst>
-                        <p:cond delay="indefinite"/>
-                      </p:stCondLst>
-                      <p:childTnLst>
-                        <p:par>
-                          <p:cTn id="28" fill="hold">
-                            <p:stCondLst>
-                              <p:cond delay="0"/>
-                            </p:stCondLst>
-                            <p:childTnLst>
-                              <p:par>
-                                <p:cTn id="29" presetID="10" presetClass="entr" presetSubtype="0" fill="hold" grpId="0" nodeType="clickEffect">
-                                  <p:stCondLst>
-                                    <p:cond delay="0"/>
-                                  </p:stCondLst>
-                                  <p:childTnLst>
-                                    <p:set>
-                                      <p:cBhvr>
-                                        <p:cTn id="30" dur="1" fill="hold">
-                                          <p:stCondLst>
-                                            <p:cond delay="0"/>
-                                          </p:stCondLst>
-                                        </p:cTn>
-                                        <p:tgtEl>
-                                          <p:spTgt spid="6"/>
-                                        </p:tgtEl>
-                                        <p:attrNameLst>
-                                          <p:attrName>style.visibility</p:attrName>
-                                        </p:attrNameLst>
-                                      </p:cBhvr>
-                                      <p:to>
-                                        <p:strVal val="visible"/>
-                                      </p:to>
-                                    </p:set>
-                                    <p:animEffect transition="in" filter="fade">
-                                      <p:cBhvr>
-                                        <p:cTn id="31" dur="500"/>
-                                        <p:tgtEl>
-                                          <p:spTgt spid="6"/>
-                                        </p:tgtEl>
-                                      </p:cBhvr>
-                                    </p:animEffect>
-                                  </p:childTnLst>
-                                </p:cTn>
-                              </p:par>
-                            </p:childTnLst>
-                          </p:cTn>
-                        </p:par>
-                      </p:childTnLst>
-                    </p:cTn>
-                  </p:par>
                 </p:childTnLst>
               </p:cTn>
               <p:prevCondLst>
@@ -9517,8 +8966,6 @@
     <p:bldLst>
       <p:bldP spid="3" grpId="0" build="p"/>
       <p:bldP spid="8" grpId="0"/>
-      <p:bldP spid="5" grpId="0"/>
-      <p:bldP spid="6" grpId="0"/>
     </p:bldLst>
   </p:timing>
 </p:sld>
@@ -10482,13 +9929,13 @@
   <p:clrMapOvr>
     <a:overrideClrMapping bg1="lt1" tx1="dk1" bg2="lt2" tx2="dk2" accent1="accent1" accent2="accent2" accent3="accent3" accent4="accent4" accent5="accent5" accent6="accent6" hlink="hlink" folHlink="folHlink"/>
   </p:clrMapOvr>
-  <mc:AlternateContent xmlns:mc="http://schemas.openxmlformats.org/markup-compatibility/2006">
-    <mc:Choice xmlns:p14="http://schemas.microsoft.com/office/powerpoint/2010/main" Requires="p14">
+  <mc:AlternateContent xmlns:mc="http://schemas.openxmlformats.org/markup-compatibility/2006" xmlns:p14="http://schemas.microsoft.com/office/powerpoint/2010/main">
+    <mc:Choice Requires="p14">
       <p:transition spd="med" p14:dur="700">
         <p:fade/>
       </p:transition>
     </mc:Choice>
-    <mc:Fallback>
+    <mc:Fallback xmlns="">
       <p:transition spd="med">
         <p:fade/>
       </p:transition>
@@ -10931,6 +10378,1418 @@
           <p:cNvPr id="2" name="Title 1">
             <a:extLst>
               <a:ext uri="{FF2B5EF4-FFF2-40B4-BE49-F238E27FC236}">
+                <a16:creationId xmlns:a16="http://schemas.microsoft.com/office/drawing/2014/main" id="{6427BEAE-1AB0-A1AD-0008-28CE14253EDF}"/>
+              </a:ext>
+            </a:extLst>
+          </p:cNvPr>
+          <p:cNvSpPr>
+            <a:spLocks noGrp="1"/>
+          </p:cNvSpPr>
+          <p:nvPr>
+            <p:ph type="title"/>
+          </p:nvPr>
+        </p:nvSpPr>
+        <p:spPr/>
+        <p:txBody>
+          <a:bodyPr/>
+          <a:lstStyle/>
+          <a:p>
+            <a:r>
+              <a:rPr lang="en-US" dirty="0"/>
+              <a:t>CNN or Resnet50?</a:t>
+            </a:r>
+          </a:p>
+        </p:txBody>
+      </p:sp>
+      <p:sp>
+        <p:nvSpPr>
+          <p:cNvPr id="3" name="Text Placeholder 2">
+            <a:extLst>
+              <a:ext uri="{FF2B5EF4-FFF2-40B4-BE49-F238E27FC236}">
+                <a16:creationId xmlns:a16="http://schemas.microsoft.com/office/drawing/2014/main" id="{37D91A09-4F81-B19B-7599-1EBDA37300CA}"/>
+              </a:ext>
+            </a:extLst>
+          </p:cNvPr>
+          <p:cNvSpPr>
+            <a:spLocks noGrp="1"/>
+          </p:cNvSpPr>
+          <p:nvPr>
+            <p:ph type="body" idx="1"/>
+          </p:nvPr>
+        </p:nvSpPr>
+        <p:spPr/>
+        <p:txBody>
+          <a:bodyPr/>
+          <a:lstStyle/>
+          <a:p>
+            <a:r>
+              <a:rPr lang="en-US" dirty="0"/>
+              <a:t>CNN</a:t>
+            </a:r>
+          </a:p>
+        </p:txBody>
+      </p:sp>
+      <p:sp>
+        <p:nvSpPr>
+          <p:cNvPr id="5" name="Text Placeholder 4">
+            <a:extLst>
+              <a:ext uri="{FF2B5EF4-FFF2-40B4-BE49-F238E27FC236}">
+                <a16:creationId xmlns:a16="http://schemas.microsoft.com/office/drawing/2014/main" id="{C97B5849-1FA1-1675-C43E-F3C6D321B21E}"/>
+              </a:ext>
+            </a:extLst>
+          </p:cNvPr>
+          <p:cNvSpPr>
+            <a:spLocks noGrp="1"/>
+          </p:cNvSpPr>
+          <p:nvPr>
+            <p:ph type="body" sz="quarter" idx="3"/>
+          </p:nvPr>
+        </p:nvSpPr>
+        <p:spPr/>
+        <p:txBody>
+          <a:bodyPr/>
+          <a:lstStyle/>
+          <a:p>
+            <a:r>
+              <a:rPr lang="en-US" dirty="0"/>
+              <a:t>ResNet50</a:t>
+            </a:r>
+          </a:p>
+        </p:txBody>
+      </p:sp>
+      <p:pic>
+        <p:nvPicPr>
+          <p:cNvPr id="7" name="Content Placeholder 6" descr="A graph of a graph of a training and training&#10;&#10;Description automatically generated with medium confidence">
+            <a:extLst>
+              <a:ext uri="{FF2B5EF4-FFF2-40B4-BE49-F238E27FC236}">
+                <a16:creationId xmlns:a16="http://schemas.microsoft.com/office/drawing/2014/main" id="{8A09DC06-C406-9279-DDCA-17191879865B}"/>
+              </a:ext>
+            </a:extLst>
+          </p:cNvPr>
+          <p:cNvPicPr>
+            <a:picLocks noGrp="1" noChangeAspect="1"/>
+          </p:cNvPicPr>
+          <p:nvPr>
+            <p:ph sz="half" idx="2"/>
+          </p:nvPr>
+        </p:nvPicPr>
+        <p:blipFill>
+          <a:blip r:embed="rId3">
+            <a:extLst>
+              <a:ext uri="{28A0092B-C50C-407E-A947-70E740481C1C}">
+                <a14:useLocalDpi xmlns:a14="http://schemas.microsoft.com/office/drawing/2010/main" val="0"/>
+              </a:ext>
+            </a:extLst>
+          </a:blip>
+          <a:stretch>
+            <a:fillRect/>
+          </a:stretch>
+        </p:blipFill>
+        <p:spPr>
+          <a:xfrm>
+            <a:off x="836612" y="2623767"/>
+            <a:ext cx="4997450" cy="2321510"/>
+          </a:xfrm>
+          <a:prstGeom prst="rect">
+            <a:avLst/>
+          </a:prstGeom>
+        </p:spPr>
+      </p:pic>
+      <p:pic>
+        <p:nvPicPr>
+          <p:cNvPr id="8" name="Content Placeholder 7">
+            <a:extLst>
+              <a:ext uri="{FF2B5EF4-FFF2-40B4-BE49-F238E27FC236}">
+                <a16:creationId xmlns:a16="http://schemas.microsoft.com/office/drawing/2014/main" id="{FE767D70-DB45-E0AF-A844-7750CA302A8F}"/>
+              </a:ext>
+            </a:extLst>
+          </p:cNvPr>
+          <p:cNvPicPr>
+            <a:picLocks noGrp="1" noChangeAspect="1"/>
+          </p:cNvPicPr>
+          <p:nvPr>
+            <p:ph sz="quarter" idx="4"/>
+          </p:nvPr>
+        </p:nvPicPr>
+        <p:blipFill rotWithShape="1">
+          <a:blip r:embed="rId4">
+            <a:extLst>
+              <a:ext uri="{28A0092B-C50C-407E-A947-70E740481C1C}">
+                <a14:useLocalDpi xmlns:a14="http://schemas.microsoft.com/office/drawing/2010/main" val="0"/>
+              </a:ext>
+            </a:extLst>
+          </a:blip>
+          <a:srcRect l="6170" t="3696" r="8737" b="-115"/>
+          <a:stretch/>
+        </p:blipFill>
+        <p:spPr>
+          <a:xfrm>
+            <a:off x="6375704" y="2623765"/>
+            <a:ext cx="5121970" cy="2321509"/>
+          </a:xfrm>
+          <a:prstGeom prst="rect">
+            <a:avLst/>
+          </a:prstGeom>
+        </p:spPr>
+      </p:pic>
+      <p:sp>
+        <p:nvSpPr>
+          <p:cNvPr id="9" name="Content Placeholder 2">
+            <a:extLst>
+              <a:ext uri="{FF2B5EF4-FFF2-40B4-BE49-F238E27FC236}">
+                <a16:creationId xmlns:a16="http://schemas.microsoft.com/office/drawing/2014/main" id="{85DD8AFF-9B7C-0DB0-3820-15331B691A67}"/>
+              </a:ext>
+            </a:extLst>
+          </p:cNvPr>
+          <p:cNvSpPr txBox="1">
+            <a:spLocks/>
+          </p:cNvSpPr>
+          <p:nvPr/>
+        </p:nvSpPr>
+        <p:spPr>
+          <a:xfrm>
+            <a:off x="6497737" y="5020222"/>
+            <a:ext cx="2700584" cy="795736"/>
+          </a:xfrm>
+          <a:prstGeom prst="rect">
+            <a:avLst/>
+          </a:prstGeom>
+        </p:spPr>
+        <p:txBody>
+          <a:bodyPr vert="horz" lIns="91440" tIns="45720" rIns="91440" bIns="45720" rtlCol="0" anchor="b">
+            <a:normAutofit fontScale="77500" lnSpcReduction="20000"/>
+          </a:bodyPr>
+          <a:lstStyle>
+            <a:lvl1pPr marL="0" indent="0" algn="l" defTabSz="914400" rtl="0" eaLnBrk="1" latinLnBrk="0" hangingPunct="1">
+              <a:lnSpc>
+                <a:spcPct val="110000"/>
+              </a:lnSpc>
+              <a:spcBef>
+                <a:spcPts val="1000"/>
+              </a:spcBef>
+              <a:buSzPct val="80000"/>
+              <a:buFont typeface="Arial" panose="020B0604020202020204" pitchFamily="34" charset="0"/>
+              <a:buNone/>
+              <a:defRPr sz="2400" b="1" i="0" kern="1200" cap="none" baseline="0">
+                <a:solidFill>
+                  <a:schemeClr val="tx1"/>
+                </a:solidFill>
+                <a:latin typeface="+mn-lt"/>
+                <a:ea typeface="+mn-ea"/>
+                <a:cs typeface="+mn-cs"/>
+              </a:defRPr>
+            </a:lvl1pPr>
+            <a:lvl2pPr marL="457200" indent="0" algn="l" defTabSz="914400" rtl="0" eaLnBrk="1" latinLnBrk="0" hangingPunct="1">
+              <a:lnSpc>
+                <a:spcPct val="110000"/>
+              </a:lnSpc>
+              <a:spcBef>
+                <a:spcPts val="500"/>
+              </a:spcBef>
+              <a:buSzPct val="80000"/>
+              <a:buFont typeface="Goudy Old Style" panose="02020502050305020303" pitchFamily="18" charset="0"/>
+              <a:buNone/>
+              <a:defRPr sz="2000" b="1" i="1" kern="1200">
+                <a:solidFill>
+                  <a:schemeClr val="tx1"/>
+                </a:solidFill>
+                <a:latin typeface="+mn-lt"/>
+                <a:ea typeface="+mn-ea"/>
+                <a:cs typeface="+mn-cs"/>
+              </a:defRPr>
+            </a:lvl2pPr>
+            <a:lvl3pPr marL="914400" indent="0" algn="l" defTabSz="914400" rtl="0" eaLnBrk="1" latinLnBrk="0" hangingPunct="1">
+              <a:lnSpc>
+                <a:spcPct val="110000"/>
+              </a:lnSpc>
+              <a:spcBef>
+                <a:spcPts val="500"/>
+              </a:spcBef>
+              <a:buSzPct val="80000"/>
+              <a:buFont typeface="Arial" panose="020B0604020202020204" pitchFamily="34" charset="0"/>
+              <a:buNone/>
+              <a:defRPr sz="1800" b="1" kern="1200">
+                <a:solidFill>
+                  <a:schemeClr val="tx1"/>
+                </a:solidFill>
+                <a:latin typeface="+mn-lt"/>
+                <a:ea typeface="+mn-ea"/>
+                <a:cs typeface="+mn-cs"/>
+              </a:defRPr>
+            </a:lvl3pPr>
+            <a:lvl4pPr marL="1371600" indent="0" algn="l" defTabSz="914400" rtl="0" eaLnBrk="1" latinLnBrk="0" hangingPunct="1">
+              <a:lnSpc>
+                <a:spcPct val="110000"/>
+              </a:lnSpc>
+              <a:spcBef>
+                <a:spcPts val="500"/>
+              </a:spcBef>
+              <a:buSzPct val="80000"/>
+              <a:buFont typeface="Goudy Old Style" panose="02020502050305020303" pitchFamily="18" charset="0"/>
+              <a:buNone/>
+              <a:defRPr sz="1600" b="1" i="1" kern="1200">
+                <a:solidFill>
+                  <a:schemeClr val="tx1"/>
+                </a:solidFill>
+                <a:latin typeface="+mn-lt"/>
+                <a:ea typeface="+mn-ea"/>
+                <a:cs typeface="+mn-cs"/>
+              </a:defRPr>
+            </a:lvl4pPr>
+            <a:lvl5pPr marL="1828800" indent="0" algn="l" defTabSz="914400" rtl="0" eaLnBrk="1" latinLnBrk="0" hangingPunct="1">
+              <a:lnSpc>
+                <a:spcPct val="110000"/>
+              </a:lnSpc>
+              <a:spcBef>
+                <a:spcPts val="500"/>
+              </a:spcBef>
+              <a:buSzPct val="80000"/>
+              <a:buFont typeface="Arial" panose="020B0604020202020204" pitchFamily="34" charset="0"/>
+              <a:buNone/>
+              <a:defRPr sz="1600" b="1" kern="1200">
+                <a:solidFill>
+                  <a:schemeClr val="tx1"/>
+                </a:solidFill>
+                <a:latin typeface="+mn-lt"/>
+                <a:ea typeface="+mn-ea"/>
+                <a:cs typeface="+mn-cs"/>
+              </a:defRPr>
+            </a:lvl5pPr>
+            <a:lvl6pPr marL="2286000" indent="0" algn="l" defTabSz="914400" rtl="0" eaLnBrk="1" latinLnBrk="0" hangingPunct="1">
+              <a:lnSpc>
+                <a:spcPct val="90000"/>
+              </a:lnSpc>
+              <a:spcBef>
+                <a:spcPts val="500"/>
+              </a:spcBef>
+              <a:buFont typeface="Arial" panose="020B0604020202020204" pitchFamily="34" charset="0"/>
+              <a:buNone/>
+              <a:defRPr sz="1600" b="1" kern="1200">
+                <a:solidFill>
+                  <a:schemeClr val="tx1"/>
+                </a:solidFill>
+                <a:latin typeface="+mn-lt"/>
+                <a:ea typeface="+mn-ea"/>
+                <a:cs typeface="+mn-cs"/>
+              </a:defRPr>
+            </a:lvl6pPr>
+            <a:lvl7pPr marL="2743200" indent="0" algn="l" defTabSz="914400" rtl="0" eaLnBrk="1" latinLnBrk="0" hangingPunct="1">
+              <a:lnSpc>
+                <a:spcPct val="90000"/>
+              </a:lnSpc>
+              <a:spcBef>
+                <a:spcPts val="500"/>
+              </a:spcBef>
+              <a:buFont typeface="Arial" panose="020B0604020202020204" pitchFamily="34" charset="0"/>
+              <a:buNone/>
+              <a:defRPr sz="1600" b="1" kern="1200">
+                <a:solidFill>
+                  <a:schemeClr val="tx1"/>
+                </a:solidFill>
+                <a:latin typeface="+mn-lt"/>
+                <a:ea typeface="+mn-ea"/>
+                <a:cs typeface="+mn-cs"/>
+              </a:defRPr>
+            </a:lvl7pPr>
+            <a:lvl8pPr marL="3200400" indent="0" algn="l" defTabSz="914400" rtl="0" eaLnBrk="1" latinLnBrk="0" hangingPunct="1">
+              <a:lnSpc>
+                <a:spcPct val="90000"/>
+              </a:lnSpc>
+              <a:spcBef>
+                <a:spcPts val="500"/>
+              </a:spcBef>
+              <a:buFont typeface="Arial" panose="020B0604020202020204" pitchFamily="34" charset="0"/>
+              <a:buNone/>
+              <a:defRPr sz="1600" b="1" kern="1200">
+                <a:solidFill>
+                  <a:schemeClr val="tx1"/>
+                </a:solidFill>
+                <a:latin typeface="+mn-lt"/>
+                <a:ea typeface="+mn-ea"/>
+                <a:cs typeface="+mn-cs"/>
+              </a:defRPr>
+            </a:lvl8pPr>
+            <a:lvl9pPr marL="3657600" indent="0" algn="l" defTabSz="914400" rtl="0" eaLnBrk="1" latinLnBrk="0" hangingPunct="1">
+              <a:lnSpc>
+                <a:spcPct val="90000"/>
+              </a:lnSpc>
+              <a:spcBef>
+                <a:spcPts val="500"/>
+              </a:spcBef>
+              <a:buFont typeface="Arial" panose="020B0604020202020204" pitchFamily="34" charset="0"/>
+              <a:buNone/>
+              <a:defRPr sz="1600" b="1" kern="1200">
+                <a:solidFill>
+                  <a:schemeClr val="tx1"/>
+                </a:solidFill>
+                <a:latin typeface="+mn-lt"/>
+                <a:ea typeface="+mn-ea"/>
+                <a:cs typeface="+mn-cs"/>
+              </a:defRPr>
+            </a:lvl9pPr>
+          </a:lstStyle>
+          <a:p>
+            <a:r>
+              <a:rPr lang="en-US" b="0" dirty="0"/>
+              <a:t>Train accuracy: 0.9752 %</a:t>
+            </a:r>
+          </a:p>
+          <a:p>
+            <a:r>
+              <a:rPr lang="en-US" b="0" dirty="0"/>
+              <a:t>Test accuracy: 0.9621%</a:t>
+            </a:r>
+          </a:p>
+        </p:txBody>
+      </p:sp>
+      <p:sp>
+        <p:nvSpPr>
+          <p:cNvPr id="10" name="Content Placeholder 2">
+            <a:extLst>
+              <a:ext uri="{FF2B5EF4-FFF2-40B4-BE49-F238E27FC236}">
+                <a16:creationId xmlns:a16="http://schemas.microsoft.com/office/drawing/2014/main" id="{4B51C91F-4226-A55D-C929-FC5D36A194B1}"/>
+              </a:ext>
+            </a:extLst>
+          </p:cNvPr>
+          <p:cNvSpPr txBox="1">
+            <a:spLocks/>
+          </p:cNvSpPr>
+          <p:nvPr/>
+        </p:nvSpPr>
+        <p:spPr>
+          <a:xfrm>
+            <a:off x="9343691" y="5006402"/>
+            <a:ext cx="1983702" cy="858448"/>
+          </a:xfrm>
+          <a:prstGeom prst="rect">
+            <a:avLst/>
+          </a:prstGeom>
+        </p:spPr>
+        <p:txBody>
+          <a:bodyPr vert="horz" lIns="91440" tIns="45720" rIns="91440" bIns="45720" rtlCol="0">
+            <a:normAutofit lnSpcReduction="10000"/>
+          </a:bodyPr>
+          <a:lstStyle>
+            <a:lvl1pPr marL="228600" indent="-228600" algn="l" defTabSz="914400" rtl="0" eaLnBrk="1" latinLnBrk="0" hangingPunct="1">
+              <a:lnSpc>
+                <a:spcPct val="110000"/>
+              </a:lnSpc>
+              <a:spcBef>
+                <a:spcPts val="1000"/>
+              </a:spcBef>
+              <a:buSzPct val="80000"/>
+              <a:buFont typeface="Arial" panose="020B0604020202020204" pitchFamily="34" charset="0"/>
+              <a:buChar char="•"/>
+              <a:defRPr sz="2000" kern="1200">
+                <a:solidFill>
+                  <a:schemeClr val="tx1"/>
+                </a:solidFill>
+                <a:latin typeface="+mn-lt"/>
+                <a:ea typeface="+mn-ea"/>
+                <a:cs typeface="+mn-cs"/>
+              </a:defRPr>
+            </a:lvl1pPr>
+            <a:lvl2pPr marL="502920" indent="-228600" algn="l" defTabSz="914400" rtl="0" eaLnBrk="1" latinLnBrk="0" hangingPunct="1">
+              <a:lnSpc>
+                <a:spcPct val="110000"/>
+              </a:lnSpc>
+              <a:spcBef>
+                <a:spcPts val="500"/>
+              </a:spcBef>
+              <a:buSzPct val="80000"/>
+              <a:buFont typeface="Goudy Old Style" panose="02020502050305020303" pitchFamily="18" charset="0"/>
+              <a:buChar char="–"/>
+              <a:defRPr sz="1800" i="1" kern="1200">
+                <a:solidFill>
+                  <a:schemeClr val="tx1"/>
+                </a:solidFill>
+                <a:latin typeface="+mn-lt"/>
+                <a:ea typeface="+mn-ea"/>
+                <a:cs typeface="+mn-cs"/>
+              </a:defRPr>
+            </a:lvl2pPr>
+            <a:lvl3pPr marL="822960" indent="-228600" algn="l" defTabSz="914400" rtl="0" eaLnBrk="1" latinLnBrk="0" hangingPunct="1">
+              <a:lnSpc>
+                <a:spcPct val="110000"/>
+              </a:lnSpc>
+              <a:spcBef>
+                <a:spcPts val="500"/>
+              </a:spcBef>
+              <a:buSzPct val="80000"/>
+              <a:buFont typeface="Arial" panose="020B0604020202020204" pitchFamily="34" charset="0"/>
+              <a:buChar char="•"/>
+              <a:defRPr sz="1600" kern="1200">
+                <a:solidFill>
+                  <a:schemeClr val="tx1"/>
+                </a:solidFill>
+                <a:latin typeface="+mn-lt"/>
+                <a:ea typeface="+mn-ea"/>
+                <a:cs typeface="+mn-cs"/>
+              </a:defRPr>
+            </a:lvl3pPr>
+            <a:lvl4pPr marL="1097280" indent="-228600" algn="l" defTabSz="914400" rtl="0" eaLnBrk="1" latinLnBrk="0" hangingPunct="1">
+              <a:lnSpc>
+                <a:spcPct val="110000"/>
+              </a:lnSpc>
+              <a:spcBef>
+                <a:spcPts val="500"/>
+              </a:spcBef>
+              <a:buSzPct val="80000"/>
+              <a:buFont typeface="Goudy Old Style" panose="02020502050305020303" pitchFamily="18" charset="0"/>
+              <a:buChar char="–"/>
+              <a:defRPr sz="1400" i="1" kern="1200">
+                <a:solidFill>
+                  <a:schemeClr val="tx1"/>
+                </a:solidFill>
+                <a:latin typeface="+mn-lt"/>
+                <a:ea typeface="+mn-ea"/>
+                <a:cs typeface="+mn-cs"/>
+              </a:defRPr>
+            </a:lvl4pPr>
+            <a:lvl5pPr marL="1371600" indent="-228600" algn="l" defTabSz="914400" rtl="0" eaLnBrk="1" latinLnBrk="0" hangingPunct="1">
+              <a:lnSpc>
+                <a:spcPct val="110000"/>
+              </a:lnSpc>
+              <a:spcBef>
+                <a:spcPts val="500"/>
+              </a:spcBef>
+              <a:buSzPct val="80000"/>
+              <a:buFont typeface="Arial" panose="020B0604020202020204" pitchFamily="34" charset="0"/>
+              <a:buChar char="•"/>
+              <a:defRPr sz="1400" kern="1200">
+                <a:solidFill>
+                  <a:schemeClr val="tx1"/>
+                </a:solidFill>
+                <a:latin typeface="+mn-lt"/>
+                <a:ea typeface="+mn-ea"/>
+                <a:cs typeface="+mn-cs"/>
+              </a:defRPr>
+            </a:lvl5pPr>
+            <a:lvl6pPr marL="2514600" indent="-228600" algn="l" defTabSz="914400" rtl="0" eaLnBrk="1" latinLnBrk="0" hangingPunct="1">
+              <a:lnSpc>
+                <a:spcPct val="90000"/>
+              </a:lnSpc>
+              <a:spcBef>
+                <a:spcPts val="500"/>
+              </a:spcBef>
+              <a:buFont typeface="Arial" panose="020B0604020202020204" pitchFamily="34" charset="0"/>
+              <a:buChar char="•"/>
+              <a:defRPr sz="1800" kern="1200">
+                <a:solidFill>
+                  <a:schemeClr val="tx1"/>
+                </a:solidFill>
+                <a:latin typeface="+mn-lt"/>
+                <a:ea typeface="+mn-ea"/>
+                <a:cs typeface="+mn-cs"/>
+              </a:defRPr>
+            </a:lvl6pPr>
+            <a:lvl7pPr marL="2971800" indent="-228600" algn="l" defTabSz="914400" rtl="0" eaLnBrk="1" latinLnBrk="0" hangingPunct="1">
+              <a:lnSpc>
+                <a:spcPct val="90000"/>
+              </a:lnSpc>
+              <a:spcBef>
+                <a:spcPts val="500"/>
+              </a:spcBef>
+              <a:buFont typeface="Arial" panose="020B0604020202020204" pitchFamily="34" charset="0"/>
+              <a:buChar char="•"/>
+              <a:defRPr sz="1800" kern="1200">
+                <a:solidFill>
+                  <a:schemeClr val="tx1"/>
+                </a:solidFill>
+                <a:latin typeface="+mn-lt"/>
+                <a:ea typeface="+mn-ea"/>
+                <a:cs typeface="+mn-cs"/>
+              </a:defRPr>
+            </a:lvl7pPr>
+            <a:lvl8pPr marL="3429000" indent="-228600" algn="l" defTabSz="914400" rtl="0" eaLnBrk="1" latinLnBrk="0" hangingPunct="1">
+              <a:lnSpc>
+                <a:spcPct val="90000"/>
+              </a:lnSpc>
+              <a:spcBef>
+                <a:spcPts val="500"/>
+              </a:spcBef>
+              <a:buFont typeface="Arial" panose="020B0604020202020204" pitchFamily="34" charset="0"/>
+              <a:buChar char="•"/>
+              <a:defRPr sz="1800" kern="1200">
+                <a:solidFill>
+                  <a:schemeClr val="tx1"/>
+                </a:solidFill>
+                <a:latin typeface="+mn-lt"/>
+                <a:ea typeface="+mn-ea"/>
+                <a:cs typeface="+mn-cs"/>
+              </a:defRPr>
+            </a:lvl8pPr>
+            <a:lvl9pPr marL="3886200" indent="-228600" algn="l" defTabSz="914400" rtl="0" eaLnBrk="1" latinLnBrk="0" hangingPunct="1">
+              <a:lnSpc>
+                <a:spcPct val="90000"/>
+              </a:lnSpc>
+              <a:spcBef>
+                <a:spcPts val="500"/>
+              </a:spcBef>
+              <a:buFont typeface="Arial" panose="020B0604020202020204" pitchFamily="34" charset="0"/>
+              <a:buChar char="•"/>
+              <a:defRPr sz="1800" kern="1200">
+                <a:solidFill>
+                  <a:schemeClr val="tx1"/>
+                </a:solidFill>
+                <a:latin typeface="+mn-lt"/>
+                <a:ea typeface="+mn-ea"/>
+                <a:cs typeface="+mn-cs"/>
+              </a:defRPr>
+            </a:lvl9pPr>
+          </a:lstStyle>
+          <a:p>
+            <a:pPr marL="0" indent="0">
+              <a:buNone/>
+            </a:pPr>
+            <a:r>
+              <a:rPr lang="en-US" dirty="0"/>
+              <a:t>Train loss: 0.0631</a:t>
+            </a:r>
+          </a:p>
+          <a:p>
+            <a:pPr marL="0" indent="0">
+              <a:buNone/>
+            </a:pPr>
+            <a:r>
+              <a:rPr lang="en-US" dirty="0"/>
+              <a:t>Test loss: 0.1263</a:t>
+            </a:r>
+          </a:p>
+        </p:txBody>
+      </p:sp>
+      <p:sp>
+        <p:nvSpPr>
+          <p:cNvPr id="11" name="Content Placeholder 2">
+            <a:extLst>
+              <a:ext uri="{FF2B5EF4-FFF2-40B4-BE49-F238E27FC236}">
+                <a16:creationId xmlns:a16="http://schemas.microsoft.com/office/drawing/2014/main" id="{627BBEF3-A30B-5245-63AA-205BC6EEA3BF}"/>
+              </a:ext>
+            </a:extLst>
+          </p:cNvPr>
+          <p:cNvSpPr txBox="1">
+            <a:spLocks/>
+          </p:cNvSpPr>
+          <p:nvPr/>
+        </p:nvSpPr>
+        <p:spPr>
+          <a:xfrm>
+            <a:off x="962684" y="4980995"/>
+            <a:ext cx="2608081" cy="994277"/>
+          </a:xfrm>
+          <a:prstGeom prst="rect">
+            <a:avLst/>
+          </a:prstGeom>
+        </p:spPr>
+        <p:txBody>
+          <a:bodyPr vert="horz" lIns="91440" tIns="45720" rIns="91440" bIns="45720" rtlCol="0">
+            <a:normAutofit fontScale="92500"/>
+          </a:bodyPr>
+          <a:lstStyle>
+            <a:lvl1pPr marL="228600" indent="-228600" algn="l" defTabSz="914400" rtl="0" eaLnBrk="1" latinLnBrk="0" hangingPunct="1">
+              <a:lnSpc>
+                <a:spcPct val="110000"/>
+              </a:lnSpc>
+              <a:spcBef>
+                <a:spcPts val="1000"/>
+              </a:spcBef>
+              <a:buSzPct val="80000"/>
+              <a:buFont typeface="Arial" panose="020B0604020202020204" pitchFamily="34" charset="0"/>
+              <a:buChar char="•"/>
+              <a:defRPr sz="2000" kern="1200">
+                <a:solidFill>
+                  <a:schemeClr val="tx1"/>
+                </a:solidFill>
+                <a:latin typeface="+mn-lt"/>
+                <a:ea typeface="+mn-ea"/>
+                <a:cs typeface="+mn-cs"/>
+              </a:defRPr>
+            </a:lvl1pPr>
+            <a:lvl2pPr marL="502920" indent="-228600" algn="l" defTabSz="914400" rtl="0" eaLnBrk="1" latinLnBrk="0" hangingPunct="1">
+              <a:lnSpc>
+                <a:spcPct val="110000"/>
+              </a:lnSpc>
+              <a:spcBef>
+                <a:spcPts val="500"/>
+              </a:spcBef>
+              <a:buSzPct val="80000"/>
+              <a:buFont typeface="Goudy Old Style" panose="02020502050305020303" pitchFamily="18" charset="0"/>
+              <a:buChar char="–"/>
+              <a:defRPr sz="1800" i="1" kern="1200">
+                <a:solidFill>
+                  <a:schemeClr val="tx1"/>
+                </a:solidFill>
+                <a:latin typeface="+mn-lt"/>
+                <a:ea typeface="+mn-ea"/>
+                <a:cs typeface="+mn-cs"/>
+              </a:defRPr>
+            </a:lvl2pPr>
+            <a:lvl3pPr marL="822960" indent="-228600" algn="l" defTabSz="914400" rtl="0" eaLnBrk="1" latinLnBrk="0" hangingPunct="1">
+              <a:lnSpc>
+                <a:spcPct val="110000"/>
+              </a:lnSpc>
+              <a:spcBef>
+                <a:spcPts val="500"/>
+              </a:spcBef>
+              <a:buSzPct val="80000"/>
+              <a:buFont typeface="Arial" panose="020B0604020202020204" pitchFamily="34" charset="0"/>
+              <a:buChar char="•"/>
+              <a:defRPr sz="1600" kern="1200">
+                <a:solidFill>
+                  <a:schemeClr val="tx1"/>
+                </a:solidFill>
+                <a:latin typeface="+mn-lt"/>
+                <a:ea typeface="+mn-ea"/>
+                <a:cs typeface="+mn-cs"/>
+              </a:defRPr>
+            </a:lvl3pPr>
+            <a:lvl4pPr marL="1097280" indent="-228600" algn="l" defTabSz="914400" rtl="0" eaLnBrk="1" latinLnBrk="0" hangingPunct="1">
+              <a:lnSpc>
+                <a:spcPct val="110000"/>
+              </a:lnSpc>
+              <a:spcBef>
+                <a:spcPts val="500"/>
+              </a:spcBef>
+              <a:buSzPct val="80000"/>
+              <a:buFont typeface="Goudy Old Style" panose="02020502050305020303" pitchFamily="18" charset="0"/>
+              <a:buChar char="–"/>
+              <a:defRPr sz="1400" i="1" kern="1200">
+                <a:solidFill>
+                  <a:schemeClr val="tx1"/>
+                </a:solidFill>
+                <a:latin typeface="+mn-lt"/>
+                <a:ea typeface="+mn-ea"/>
+                <a:cs typeface="+mn-cs"/>
+              </a:defRPr>
+            </a:lvl4pPr>
+            <a:lvl5pPr marL="1371600" indent="-228600" algn="l" defTabSz="914400" rtl="0" eaLnBrk="1" latinLnBrk="0" hangingPunct="1">
+              <a:lnSpc>
+                <a:spcPct val="110000"/>
+              </a:lnSpc>
+              <a:spcBef>
+                <a:spcPts val="500"/>
+              </a:spcBef>
+              <a:buSzPct val="80000"/>
+              <a:buFont typeface="Arial" panose="020B0604020202020204" pitchFamily="34" charset="0"/>
+              <a:buChar char="•"/>
+              <a:defRPr sz="1400" kern="1200">
+                <a:solidFill>
+                  <a:schemeClr val="tx1"/>
+                </a:solidFill>
+                <a:latin typeface="+mn-lt"/>
+                <a:ea typeface="+mn-ea"/>
+                <a:cs typeface="+mn-cs"/>
+              </a:defRPr>
+            </a:lvl5pPr>
+            <a:lvl6pPr marL="2514600" indent="-228600" algn="l" defTabSz="914400" rtl="0" eaLnBrk="1" latinLnBrk="0" hangingPunct="1">
+              <a:lnSpc>
+                <a:spcPct val="90000"/>
+              </a:lnSpc>
+              <a:spcBef>
+                <a:spcPts val="500"/>
+              </a:spcBef>
+              <a:buFont typeface="Arial" panose="020B0604020202020204" pitchFamily="34" charset="0"/>
+              <a:buChar char="•"/>
+              <a:defRPr sz="1800" kern="1200">
+                <a:solidFill>
+                  <a:schemeClr val="tx1"/>
+                </a:solidFill>
+                <a:latin typeface="+mn-lt"/>
+                <a:ea typeface="+mn-ea"/>
+                <a:cs typeface="+mn-cs"/>
+              </a:defRPr>
+            </a:lvl6pPr>
+            <a:lvl7pPr marL="2971800" indent="-228600" algn="l" defTabSz="914400" rtl="0" eaLnBrk="1" latinLnBrk="0" hangingPunct="1">
+              <a:lnSpc>
+                <a:spcPct val="90000"/>
+              </a:lnSpc>
+              <a:spcBef>
+                <a:spcPts val="500"/>
+              </a:spcBef>
+              <a:buFont typeface="Arial" panose="020B0604020202020204" pitchFamily="34" charset="0"/>
+              <a:buChar char="•"/>
+              <a:defRPr sz="1800" kern="1200">
+                <a:solidFill>
+                  <a:schemeClr val="tx1"/>
+                </a:solidFill>
+                <a:latin typeface="+mn-lt"/>
+                <a:ea typeface="+mn-ea"/>
+                <a:cs typeface="+mn-cs"/>
+              </a:defRPr>
+            </a:lvl7pPr>
+            <a:lvl8pPr marL="3429000" indent="-228600" algn="l" defTabSz="914400" rtl="0" eaLnBrk="1" latinLnBrk="0" hangingPunct="1">
+              <a:lnSpc>
+                <a:spcPct val="90000"/>
+              </a:lnSpc>
+              <a:spcBef>
+                <a:spcPts val="500"/>
+              </a:spcBef>
+              <a:buFont typeface="Arial" panose="020B0604020202020204" pitchFamily="34" charset="0"/>
+              <a:buChar char="•"/>
+              <a:defRPr sz="1800" kern="1200">
+                <a:solidFill>
+                  <a:schemeClr val="tx1"/>
+                </a:solidFill>
+                <a:latin typeface="+mn-lt"/>
+                <a:ea typeface="+mn-ea"/>
+                <a:cs typeface="+mn-cs"/>
+              </a:defRPr>
+            </a:lvl8pPr>
+            <a:lvl9pPr marL="3886200" indent="-228600" algn="l" defTabSz="914400" rtl="0" eaLnBrk="1" latinLnBrk="0" hangingPunct="1">
+              <a:lnSpc>
+                <a:spcPct val="90000"/>
+              </a:lnSpc>
+              <a:spcBef>
+                <a:spcPts val="500"/>
+              </a:spcBef>
+              <a:buFont typeface="Arial" panose="020B0604020202020204" pitchFamily="34" charset="0"/>
+              <a:buChar char="•"/>
+              <a:defRPr sz="1800" kern="1200">
+                <a:solidFill>
+                  <a:schemeClr val="tx1"/>
+                </a:solidFill>
+                <a:latin typeface="+mn-lt"/>
+                <a:ea typeface="+mn-ea"/>
+                <a:cs typeface="+mn-cs"/>
+              </a:defRPr>
+            </a:lvl9pPr>
+          </a:lstStyle>
+          <a:p>
+            <a:pPr marL="0" indent="0">
+              <a:buFont typeface="Arial" panose="020B0604020202020204" pitchFamily="34" charset="0"/>
+              <a:buNone/>
+            </a:pPr>
+            <a:r>
+              <a:rPr lang="en-US" dirty="0"/>
+              <a:t>Train accuracy: 0.9120% </a:t>
+            </a:r>
+          </a:p>
+          <a:p>
+            <a:pPr marL="0" indent="0">
+              <a:buFont typeface="Arial" panose="020B0604020202020204" pitchFamily="34" charset="0"/>
+              <a:buNone/>
+            </a:pPr>
+            <a:r>
+              <a:rPr lang="en-US" dirty="0"/>
+              <a:t>Test accuracy: 0.8907%</a:t>
+            </a:r>
+          </a:p>
+        </p:txBody>
+      </p:sp>
+      <p:sp>
+        <p:nvSpPr>
+          <p:cNvPr id="12" name="Content Placeholder 2">
+            <a:extLst>
+              <a:ext uri="{FF2B5EF4-FFF2-40B4-BE49-F238E27FC236}">
+                <a16:creationId xmlns:a16="http://schemas.microsoft.com/office/drawing/2014/main" id="{D33970AB-FDBA-C612-67CD-76DFF6D7D85C}"/>
+              </a:ext>
+            </a:extLst>
+          </p:cNvPr>
+          <p:cNvSpPr txBox="1">
+            <a:spLocks/>
+          </p:cNvSpPr>
+          <p:nvPr/>
+        </p:nvSpPr>
+        <p:spPr>
+          <a:xfrm>
+            <a:off x="3710563" y="4945274"/>
+            <a:ext cx="1983702" cy="945632"/>
+          </a:xfrm>
+          <a:prstGeom prst="rect">
+            <a:avLst/>
+          </a:prstGeom>
+        </p:spPr>
+        <p:txBody>
+          <a:bodyPr vert="horz" lIns="91440" tIns="45720" rIns="91440" bIns="45720" rtlCol="0">
+            <a:normAutofit/>
+          </a:bodyPr>
+          <a:lstStyle>
+            <a:lvl1pPr marL="228600" indent="-228600" algn="l" defTabSz="914400" rtl="0" eaLnBrk="1" latinLnBrk="0" hangingPunct="1">
+              <a:lnSpc>
+                <a:spcPct val="110000"/>
+              </a:lnSpc>
+              <a:spcBef>
+                <a:spcPts val="1000"/>
+              </a:spcBef>
+              <a:buSzPct val="80000"/>
+              <a:buFont typeface="Arial" panose="020B0604020202020204" pitchFamily="34" charset="0"/>
+              <a:buChar char="•"/>
+              <a:defRPr sz="2000" kern="1200">
+                <a:solidFill>
+                  <a:schemeClr val="tx1"/>
+                </a:solidFill>
+                <a:latin typeface="+mn-lt"/>
+                <a:ea typeface="+mn-ea"/>
+                <a:cs typeface="+mn-cs"/>
+              </a:defRPr>
+            </a:lvl1pPr>
+            <a:lvl2pPr marL="502920" indent="-228600" algn="l" defTabSz="914400" rtl="0" eaLnBrk="1" latinLnBrk="0" hangingPunct="1">
+              <a:lnSpc>
+                <a:spcPct val="110000"/>
+              </a:lnSpc>
+              <a:spcBef>
+                <a:spcPts val="500"/>
+              </a:spcBef>
+              <a:buSzPct val="80000"/>
+              <a:buFont typeface="Goudy Old Style" panose="02020502050305020303" pitchFamily="18" charset="0"/>
+              <a:buChar char="–"/>
+              <a:defRPr sz="1800" i="1" kern="1200">
+                <a:solidFill>
+                  <a:schemeClr val="tx1"/>
+                </a:solidFill>
+                <a:latin typeface="+mn-lt"/>
+                <a:ea typeface="+mn-ea"/>
+                <a:cs typeface="+mn-cs"/>
+              </a:defRPr>
+            </a:lvl2pPr>
+            <a:lvl3pPr marL="822960" indent="-228600" algn="l" defTabSz="914400" rtl="0" eaLnBrk="1" latinLnBrk="0" hangingPunct="1">
+              <a:lnSpc>
+                <a:spcPct val="110000"/>
+              </a:lnSpc>
+              <a:spcBef>
+                <a:spcPts val="500"/>
+              </a:spcBef>
+              <a:buSzPct val="80000"/>
+              <a:buFont typeface="Arial" panose="020B0604020202020204" pitchFamily="34" charset="0"/>
+              <a:buChar char="•"/>
+              <a:defRPr sz="1600" kern="1200">
+                <a:solidFill>
+                  <a:schemeClr val="tx1"/>
+                </a:solidFill>
+                <a:latin typeface="+mn-lt"/>
+                <a:ea typeface="+mn-ea"/>
+                <a:cs typeface="+mn-cs"/>
+              </a:defRPr>
+            </a:lvl3pPr>
+            <a:lvl4pPr marL="1097280" indent="-228600" algn="l" defTabSz="914400" rtl="0" eaLnBrk="1" latinLnBrk="0" hangingPunct="1">
+              <a:lnSpc>
+                <a:spcPct val="110000"/>
+              </a:lnSpc>
+              <a:spcBef>
+                <a:spcPts val="500"/>
+              </a:spcBef>
+              <a:buSzPct val="80000"/>
+              <a:buFont typeface="Goudy Old Style" panose="02020502050305020303" pitchFamily="18" charset="0"/>
+              <a:buChar char="–"/>
+              <a:defRPr sz="1400" i="1" kern="1200">
+                <a:solidFill>
+                  <a:schemeClr val="tx1"/>
+                </a:solidFill>
+                <a:latin typeface="+mn-lt"/>
+                <a:ea typeface="+mn-ea"/>
+                <a:cs typeface="+mn-cs"/>
+              </a:defRPr>
+            </a:lvl4pPr>
+            <a:lvl5pPr marL="1371600" indent="-228600" algn="l" defTabSz="914400" rtl="0" eaLnBrk="1" latinLnBrk="0" hangingPunct="1">
+              <a:lnSpc>
+                <a:spcPct val="110000"/>
+              </a:lnSpc>
+              <a:spcBef>
+                <a:spcPts val="500"/>
+              </a:spcBef>
+              <a:buSzPct val="80000"/>
+              <a:buFont typeface="Arial" panose="020B0604020202020204" pitchFamily="34" charset="0"/>
+              <a:buChar char="•"/>
+              <a:defRPr sz="1400" kern="1200">
+                <a:solidFill>
+                  <a:schemeClr val="tx1"/>
+                </a:solidFill>
+                <a:latin typeface="+mn-lt"/>
+                <a:ea typeface="+mn-ea"/>
+                <a:cs typeface="+mn-cs"/>
+              </a:defRPr>
+            </a:lvl5pPr>
+            <a:lvl6pPr marL="2514600" indent="-228600" algn="l" defTabSz="914400" rtl="0" eaLnBrk="1" latinLnBrk="0" hangingPunct="1">
+              <a:lnSpc>
+                <a:spcPct val="90000"/>
+              </a:lnSpc>
+              <a:spcBef>
+                <a:spcPts val="500"/>
+              </a:spcBef>
+              <a:buFont typeface="Arial" panose="020B0604020202020204" pitchFamily="34" charset="0"/>
+              <a:buChar char="•"/>
+              <a:defRPr sz="1800" kern="1200">
+                <a:solidFill>
+                  <a:schemeClr val="tx1"/>
+                </a:solidFill>
+                <a:latin typeface="+mn-lt"/>
+                <a:ea typeface="+mn-ea"/>
+                <a:cs typeface="+mn-cs"/>
+              </a:defRPr>
+            </a:lvl6pPr>
+            <a:lvl7pPr marL="2971800" indent="-228600" algn="l" defTabSz="914400" rtl="0" eaLnBrk="1" latinLnBrk="0" hangingPunct="1">
+              <a:lnSpc>
+                <a:spcPct val="90000"/>
+              </a:lnSpc>
+              <a:spcBef>
+                <a:spcPts val="500"/>
+              </a:spcBef>
+              <a:buFont typeface="Arial" panose="020B0604020202020204" pitchFamily="34" charset="0"/>
+              <a:buChar char="•"/>
+              <a:defRPr sz="1800" kern="1200">
+                <a:solidFill>
+                  <a:schemeClr val="tx1"/>
+                </a:solidFill>
+                <a:latin typeface="+mn-lt"/>
+                <a:ea typeface="+mn-ea"/>
+                <a:cs typeface="+mn-cs"/>
+              </a:defRPr>
+            </a:lvl7pPr>
+            <a:lvl8pPr marL="3429000" indent="-228600" algn="l" defTabSz="914400" rtl="0" eaLnBrk="1" latinLnBrk="0" hangingPunct="1">
+              <a:lnSpc>
+                <a:spcPct val="90000"/>
+              </a:lnSpc>
+              <a:spcBef>
+                <a:spcPts val="500"/>
+              </a:spcBef>
+              <a:buFont typeface="Arial" panose="020B0604020202020204" pitchFamily="34" charset="0"/>
+              <a:buChar char="•"/>
+              <a:defRPr sz="1800" kern="1200">
+                <a:solidFill>
+                  <a:schemeClr val="tx1"/>
+                </a:solidFill>
+                <a:latin typeface="+mn-lt"/>
+                <a:ea typeface="+mn-ea"/>
+                <a:cs typeface="+mn-cs"/>
+              </a:defRPr>
+            </a:lvl8pPr>
+            <a:lvl9pPr marL="3886200" indent="-228600" algn="l" defTabSz="914400" rtl="0" eaLnBrk="1" latinLnBrk="0" hangingPunct="1">
+              <a:lnSpc>
+                <a:spcPct val="90000"/>
+              </a:lnSpc>
+              <a:spcBef>
+                <a:spcPts val="500"/>
+              </a:spcBef>
+              <a:buFont typeface="Arial" panose="020B0604020202020204" pitchFamily="34" charset="0"/>
+              <a:buChar char="•"/>
+              <a:defRPr sz="1800" kern="1200">
+                <a:solidFill>
+                  <a:schemeClr val="tx1"/>
+                </a:solidFill>
+                <a:latin typeface="+mn-lt"/>
+                <a:ea typeface="+mn-ea"/>
+                <a:cs typeface="+mn-cs"/>
+              </a:defRPr>
+            </a:lvl9pPr>
+          </a:lstStyle>
+          <a:p>
+            <a:pPr marL="0" indent="0">
+              <a:buNone/>
+            </a:pPr>
+            <a:r>
+              <a:rPr lang="en-US" dirty="0"/>
+              <a:t>Train loss: 0.2787</a:t>
+            </a:r>
+          </a:p>
+          <a:p>
+            <a:pPr marL="0" indent="0">
+              <a:buNone/>
+            </a:pPr>
+            <a:r>
+              <a:rPr lang="en-US" dirty="0"/>
+              <a:t>Test loss: 0.2877</a:t>
+            </a:r>
+          </a:p>
+        </p:txBody>
+      </p:sp>
+    </p:spTree>
+    <p:extLst>
+      <p:ext uri="{BB962C8B-B14F-4D97-AF65-F5344CB8AC3E}">
+        <p14:creationId xmlns:p14="http://schemas.microsoft.com/office/powerpoint/2010/main" val="3529111660"/>
+      </p:ext>
+    </p:extLst>
+  </p:cSld>
+  <p:clrMapOvr>
+    <a:overrideClrMapping bg1="lt1" tx1="dk1" bg2="lt2" tx2="dk2" accent1="accent1" accent2="accent2" accent3="accent3" accent4="accent4" accent5="accent5" accent6="accent6" hlink="hlink" folHlink="folHlink"/>
+  </p:clrMapOvr>
+  <p:timing>
+    <p:tnLst>
+      <p:par>
+        <p:cTn id="1" dur="indefinite" restart="never" nodeType="tmRoot">
+          <p:childTnLst>
+            <p:seq concurrent="1" nextAc="seek">
+              <p:cTn id="2" dur="indefinite" nodeType="mainSeq">
+                <p:childTnLst>
+                  <p:par>
+                    <p:cTn id="3" fill="hold">
+                      <p:stCondLst>
+                        <p:cond delay="indefinite"/>
+                        <p:cond evt="onBegin" delay="0">
+                          <p:tn val="2"/>
+                        </p:cond>
+                      </p:stCondLst>
+                      <p:childTnLst>
+                        <p:par>
+                          <p:cTn id="4" fill="hold">
+                            <p:stCondLst>
+                              <p:cond delay="0"/>
+                            </p:stCondLst>
+                            <p:childTnLst>
+                              <p:par>
+                                <p:cTn id="5" presetID="10" presetClass="entr" presetSubtype="0" fill="hold" grpId="0" nodeType="withEffect">
+                                  <p:stCondLst>
+                                    <p:cond delay="0"/>
+                                  </p:stCondLst>
+                                  <p:childTnLst>
+                                    <p:set>
+                                      <p:cBhvr>
+                                        <p:cTn id="6" dur="1" fill="hold">
+                                          <p:stCondLst>
+                                            <p:cond delay="0"/>
+                                          </p:stCondLst>
+                                        </p:cTn>
+                                        <p:tgtEl>
+                                          <p:spTgt spid="3">
+                                            <p:txEl>
+                                              <p:pRg st="0" end="0"/>
+                                            </p:txEl>
+                                          </p:spTgt>
+                                        </p:tgtEl>
+                                        <p:attrNameLst>
+                                          <p:attrName>style.visibility</p:attrName>
+                                        </p:attrNameLst>
+                                      </p:cBhvr>
+                                      <p:to>
+                                        <p:strVal val="visible"/>
+                                      </p:to>
+                                    </p:set>
+                                    <p:animEffect transition="in" filter="fade">
+                                      <p:cBhvr>
+                                        <p:cTn id="7" dur="500"/>
+                                        <p:tgtEl>
+                                          <p:spTgt spid="3">
+                                            <p:txEl>
+                                              <p:pRg st="0" end="0"/>
+                                            </p:txEl>
+                                          </p:spTgt>
+                                        </p:tgtEl>
+                                      </p:cBhvr>
+                                    </p:animEffect>
+                                  </p:childTnLst>
+                                </p:cTn>
+                              </p:par>
+                              <p:par>
+                                <p:cTn id="8" presetID="10" presetClass="entr" presetSubtype="0" fill="hold" grpId="0" nodeType="withEffect">
+                                  <p:stCondLst>
+                                    <p:cond delay="300"/>
+                                  </p:stCondLst>
+                                  <p:childTnLst>
+                                    <p:set>
+                                      <p:cBhvr>
+                                        <p:cTn id="9" dur="1" fill="hold">
+                                          <p:stCondLst>
+                                            <p:cond delay="0"/>
+                                          </p:stCondLst>
+                                        </p:cTn>
+                                        <p:tgtEl>
+                                          <p:spTgt spid="5">
+                                            <p:txEl>
+                                              <p:pRg st="0" end="0"/>
+                                            </p:txEl>
+                                          </p:spTgt>
+                                        </p:tgtEl>
+                                        <p:attrNameLst>
+                                          <p:attrName>style.visibility</p:attrName>
+                                        </p:attrNameLst>
+                                      </p:cBhvr>
+                                      <p:to>
+                                        <p:strVal val="visible"/>
+                                      </p:to>
+                                    </p:set>
+                                    <p:animEffect transition="in" filter="fade">
+                                      <p:cBhvr>
+                                        <p:cTn id="10" dur="500"/>
+                                        <p:tgtEl>
+                                          <p:spTgt spid="5">
+                                            <p:txEl>
+                                              <p:pRg st="0" end="0"/>
+                                            </p:txEl>
+                                          </p:spTgt>
+                                        </p:tgtEl>
+                                      </p:cBhvr>
+                                    </p:animEffect>
+                                  </p:childTnLst>
+                                </p:cTn>
+                              </p:par>
+                              <p:par>
+                                <p:cTn id="11" presetID="10" presetClass="entr" presetSubtype="0" fill="hold" nodeType="withEffect">
+                                  <p:stCondLst>
+                                    <p:cond delay="500"/>
+                                  </p:stCondLst>
+                                  <p:childTnLst>
+                                    <p:set>
+                                      <p:cBhvr>
+                                        <p:cTn id="12" dur="1" fill="hold">
+                                          <p:stCondLst>
+                                            <p:cond delay="0"/>
+                                          </p:stCondLst>
+                                        </p:cTn>
+                                        <p:tgtEl>
+                                          <p:spTgt spid="7"/>
+                                        </p:tgtEl>
+                                        <p:attrNameLst>
+                                          <p:attrName>style.visibility</p:attrName>
+                                        </p:attrNameLst>
+                                      </p:cBhvr>
+                                      <p:to>
+                                        <p:strVal val="visible"/>
+                                      </p:to>
+                                    </p:set>
+                                    <p:animEffect transition="in" filter="fade">
+                                      <p:cBhvr>
+                                        <p:cTn id="13" dur="500"/>
+                                        <p:tgtEl>
+                                          <p:spTgt spid="7"/>
+                                        </p:tgtEl>
+                                      </p:cBhvr>
+                                    </p:animEffect>
+                                  </p:childTnLst>
+                                </p:cTn>
+                              </p:par>
+                              <p:par>
+                                <p:cTn id="14" presetID="10" presetClass="entr" presetSubtype="0" fill="hold" nodeType="withEffect">
+                                  <p:stCondLst>
+                                    <p:cond delay="600"/>
+                                  </p:stCondLst>
+                                  <p:childTnLst>
+                                    <p:set>
+                                      <p:cBhvr>
+                                        <p:cTn id="15" dur="1" fill="hold">
+                                          <p:stCondLst>
+                                            <p:cond delay="0"/>
+                                          </p:stCondLst>
+                                        </p:cTn>
+                                        <p:tgtEl>
+                                          <p:spTgt spid="8"/>
+                                        </p:tgtEl>
+                                        <p:attrNameLst>
+                                          <p:attrName>style.visibility</p:attrName>
+                                        </p:attrNameLst>
+                                      </p:cBhvr>
+                                      <p:to>
+                                        <p:strVal val="visible"/>
+                                      </p:to>
+                                    </p:set>
+                                    <p:animEffect transition="in" filter="fade">
+                                      <p:cBhvr>
+                                        <p:cTn id="16" dur="500"/>
+                                        <p:tgtEl>
+                                          <p:spTgt spid="8"/>
+                                        </p:tgtEl>
+                                      </p:cBhvr>
+                                    </p:animEffect>
+                                  </p:childTnLst>
+                                </p:cTn>
+                              </p:par>
+                              <p:par>
+                                <p:cTn id="17" presetID="10" presetClass="entr" presetSubtype="0" fill="hold" grpId="0" nodeType="withEffect">
+                                  <p:stCondLst>
+                                    <p:cond delay="800"/>
+                                  </p:stCondLst>
+                                  <p:childTnLst>
+                                    <p:set>
+                                      <p:cBhvr>
+                                        <p:cTn id="18" dur="1" fill="hold">
+                                          <p:stCondLst>
+                                            <p:cond delay="0"/>
+                                          </p:stCondLst>
+                                        </p:cTn>
+                                        <p:tgtEl>
+                                          <p:spTgt spid="11"/>
+                                        </p:tgtEl>
+                                        <p:attrNameLst>
+                                          <p:attrName>style.visibility</p:attrName>
+                                        </p:attrNameLst>
+                                      </p:cBhvr>
+                                      <p:to>
+                                        <p:strVal val="visible"/>
+                                      </p:to>
+                                    </p:set>
+                                    <p:animEffect transition="in" filter="fade">
+                                      <p:cBhvr>
+                                        <p:cTn id="19" dur="500"/>
+                                        <p:tgtEl>
+                                          <p:spTgt spid="11"/>
+                                        </p:tgtEl>
+                                      </p:cBhvr>
+                                    </p:animEffect>
+                                  </p:childTnLst>
+                                </p:cTn>
+                              </p:par>
+                              <p:par>
+                                <p:cTn id="20" presetID="10" presetClass="entr" presetSubtype="0" fill="hold" grpId="0" nodeType="withEffect">
+                                  <p:stCondLst>
+                                    <p:cond delay="1100"/>
+                                  </p:stCondLst>
+                                  <p:childTnLst>
+                                    <p:set>
+                                      <p:cBhvr>
+                                        <p:cTn id="21" dur="1" fill="hold">
+                                          <p:stCondLst>
+                                            <p:cond delay="0"/>
+                                          </p:stCondLst>
+                                        </p:cTn>
+                                        <p:tgtEl>
+                                          <p:spTgt spid="12"/>
+                                        </p:tgtEl>
+                                        <p:attrNameLst>
+                                          <p:attrName>style.visibility</p:attrName>
+                                        </p:attrNameLst>
+                                      </p:cBhvr>
+                                      <p:to>
+                                        <p:strVal val="visible"/>
+                                      </p:to>
+                                    </p:set>
+                                    <p:animEffect transition="in" filter="fade">
+                                      <p:cBhvr>
+                                        <p:cTn id="22" dur="500"/>
+                                        <p:tgtEl>
+                                          <p:spTgt spid="12"/>
+                                        </p:tgtEl>
+                                      </p:cBhvr>
+                                    </p:animEffect>
+                                  </p:childTnLst>
+                                </p:cTn>
+                              </p:par>
+                              <p:par>
+                                <p:cTn id="23" presetID="10" presetClass="entr" presetSubtype="0" fill="hold" grpId="0" nodeType="withEffect">
+                                  <p:stCondLst>
+                                    <p:cond delay="1400"/>
+                                  </p:stCondLst>
+                                  <p:childTnLst>
+                                    <p:set>
+                                      <p:cBhvr>
+                                        <p:cTn id="24" dur="1" fill="hold">
+                                          <p:stCondLst>
+                                            <p:cond delay="0"/>
+                                          </p:stCondLst>
+                                        </p:cTn>
+                                        <p:tgtEl>
+                                          <p:spTgt spid="9"/>
+                                        </p:tgtEl>
+                                        <p:attrNameLst>
+                                          <p:attrName>style.visibility</p:attrName>
+                                        </p:attrNameLst>
+                                      </p:cBhvr>
+                                      <p:to>
+                                        <p:strVal val="visible"/>
+                                      </p:to>
+                                    </p:set>
+                                    <p:animEffect transition="in" filter="fade">
+                                      <p:cBhvr>
+                                        <p:cTn id="25" dur="500"/>
+                                        <p:tgtEl>
+                                          <p:spTgt spid="9"/>
+                                        </p:tgtEl>
+                                      </p:cBhvr>
+                                    </p:animEffect>
+                                  </p:childTnLst>
+                                </p:cTn>
+                              </p:par>
+                              <p:par>
+                                <p:cTn id="26" presetID="10" presetClass="entr" presetSubtype="0" fill="hold" grpId="0" nodeType="withEffect">
+                                  <p:stCondLst>
+                                    <p:cond delay="1700"/>
+                                  </p:stCondLst>
+                                  <p:childTnLst>
+                                    <p:set>
+                                      <p:cBhvr>
+                                        <p:cTn id="27" dur="1" fill="hold">
+                                          <p:stCondLst>
+                                            <p:cond delay="0"/>
+                                          </p:stCondLst>
+                                        </p:cTn>
+                                        <p:tgtEl>
+                                          <p:spTgt spid="10"/>
+                                        </p:tgtEl>
+                                        <p:attrNameLst>
+                                          <p:attrName>style.visibility</p:attrName>
+                                        </p:attrNameLst>
+                                      </p:cBhvr>
+                                      <p:to>
+                                        <p:strVal val="visible"/>
+                                      </p:to>
+                                    </p:set>
+                                    <p:animEffect transition="in" filter="fade">
+                                      <p:cBhvr>
+                                        <p:cTn id="28" dur="500"/>
+                                        <p:tgtEl>
+                                          <p:spTgt spid="10"/>
+                                        </p:tgtEl>
+                                      </p:cBhvr>
+                                    </p:animEffect>
+                                  </p:childTnLst>
+                                </p:cTn>
+                              </p:par>
+                            </p:childTnLst>
+                          </p:cTn>
+                        </p:par>
+                      </p:childTnLst>
+                    </p:cTn>
+                  </p:par>
+                </p:childTnLst>
+              </p:cTn>
+              <p:prevCondLst>
+                <p:cond evt="onPrev" delay="0">
+                  <p:tgtEl>
+                    <p:sldTgt/>
+                  </p:tgtEl>
+                </p:cond>
+              </p:prevCondLst>
+              <p:nextCondLst>
+                <p:cond evt="onNext" delay="0">
+                  <p:tgtEl>
+                    <p:sldTgt/>
+                  </p:tgtEl>
+                </p:cond>
+              </p:nextCondLst>
+            </p:seq>
+          </p:childTnLst>
+        </p:cTn>
+      </p:par>
+    </p:tnLst>
+    <p:bldLst>
+      <p:bldP spid="3" grpId="0" build="p"/>
+      <p:bldP spid="5" grpId="0" build="p"/>
+      <p:bldP spid="9" grpId="0"/>
+      <p:bldP spid="10" grpId="0"/>
+      <p:bldP spid="11" grpId="0"/>
+      <p:bldP spid="12" grpId="0"/>
+    </p:bldLst>
+  </p:timing>
+</p:sld>
+</file>
+
+<file path=ppt/slides/slide14.xml><?xml version="1.0" encoding="utf-8"?>
+<p:sld xmlns:a="http://schemas.openxmlformats.org/drawingml/2006/main" xmlns:r="http://schemas.openxmlformats.org/officeDocument/2006/relationships" xmlns:p="http://schemas.openxmlformats.org/presentationml/2006/main">
+  <p:cSld>
+    <p:bg>
+      <p:bgPr>
+        <a:solidFill>
+          <a:schemeClr val="bg1"/>
+        </a:solidFill>
+        <a:effectLst/>
+      </p:bgPr>
+    </p:bg>
+    <p:spTree>
+      <p:nvGrpSpPr>
+        <p:cNvPr id="1" name=""/>
+        <p:cNvGrpSpPr/>
+        <p:nvPr/>
+      </p:nvGrpSpPr>
+      <p:grpSpPr>
+        <a:xfrm>
+          <a:off x="0" y="0"/>
+          <a:ext cx="0" cy="0"/>
+          <a:chOff x="0" y="0"/>
+          <a:chExt cx="0" cy="0"/>
+        </a:xfrm>
+      </p:grpSpPr>
+      <p:sp>
+        <p:nvSpPr>
+          <p:cNvPr id="2" name="Title 1">
+            <a:extLst>
+              <a:ext uri="{FF2B5EF4-FFF2-40B4-BE49-F238E27FC236}">
                 <a16:creationId xmlns:a16="http://schemas.microsoft.com/office/drawing/2014/main" id="{BC1BDBB0-0078-B443-7A5F-CEBC2DB8DD8B}"/>
               </a:ext>
             </a:extLst>
@@ -11064,13 +11923,13 @@
   <p:clrMapOvr>
     <a:overrideClrMapping bg1="lt1" tx1="dk1" bg2="lt2" tx2="dk2" accent1="accent1" accent2="accent2" accent3="accent3" accent4="accent4" accent5="accent5" accent6="accent6" hlink="hlink" folHlink="folHlink"/>
   </p:clrMapOvr>
-  <mc:AlternateContent xmlns:mc="http://schemas.openxmlformats.org/markup-compatibility/2006">
-    <mc:Choice xmlns:p14="http://schemas.microsoft.com/office/powerpoint/2010/main" Requires="p14">
+  <mc:AlternateContent xmlns:mc="http://schemas.openxmlformats.org/markup-compatibility/2006" xmlns:p14="http://schemas.microsoft.com/office/powerpoint/2010/main">
+    <mc:Choice Requires="p14">
       <p:transition spd="med" p14:dur="700">
         <p:fade/>
       </p:transition>
     </mc:Choice>
-    <mc:Fallback>
+    <mc:Fallback xmlns="">
       <p:transition spd="med">
         <p:fade/>
       </p:transition>
@@ -11079,7 +11938,7 @@
 </p:sld>
 </file>
 
-<file path=ppt/slides/slide14.xml><?xml version="1.0" encoding="utf-8"?>
+<file path=ppt/slides/slide15.xml><?xml version="1.0" encoding="utf-8"?>
 <p:sld xmlns:a="http://schemas.openxmlformats.org/drawingml/2006/main" xmlns:r="http://schemas.openxmlformats.org/officeDocument/2006/relationships" xmlns:p="http://schemas.openxmlformats.org/presentationml/2006/main">
   <p:cSld>
     <p:bg>
@@ -11743,13 +12602,13 @@
   <p:clrMapOvr>
     <a:masterClrMapping/>
   </p:clrMapOvr>
-  <mc:AlternateContent xmlns:mc="http://schemas.openxmlformats.org/markup-compatibility/2006">
-    <mc:Choice xmlns:p14="http://schemas.microsoft.com/office/powerpoint/2010/main" Requires="p14">
+  <mc:AlternateContent xmlns:mc="http://schemas.openxmlformats.org/markup-compatibility/2006" xmlns:p14="http://schemas.microsoft.com/office/powerpoint/2010/main">
+    <mc:Choice Requires="p14">
       <p:transition spd="med" p14:dur="700">
         <p:fade/>
       </p:transition>
     </mc:Choice>
-    <mc:Fallback>
+    <mc:Fallback xmlns="">
       <p:transition spd="med">
         <p:fade/>
       </p:transition>
@@ -12354,13 +13213,13 @@
   <p:clrMapOvr>
     <a:overrideClrMapping bg1="lt1" tx1="dk1" bg2="lt2" tx2="dk2" accent1="accent1" accent2="accent2" accent3="accent3" accent4="accent4" accent5="accent5" accent6="accent6" hlink="hlink" folHlink="folHlink"/>
   </p:clrMapOvr>
-  <mc:AlternateContent xmlns:mc="http://schemas.openxmlformats.org/markup-compatibility/2006">
-    <mc:Choice xmlns:p14="http://schemas.microsoft.com/office/powerpoint/2010/main" Requires="p14">
+  <mc:AlternateContent xmlns:mc="http://schemas.openxmlformats.org/markup-compatibility/2006" xmlns:p14="http://schemas.microsoft.com/office/powerpoint/2010/main">
+    <mc:Choice Requires="p14">
       <p:transition spd="med" p14:dur="700">
         <p:fade/>
       </p:transition>
     </mc:Choice>
-    <mc:Fallback>
+    <mc:Fallback xmlns="">
       <p:transition spd="med">
         <p:fade/>
       </p:transition>
@@ -12732,13 +13591,13 @@
   <p:clrMapOvr>
     <a:overrideClrMapping bg1="lt1" tx1="dk1" bg2="lt2" tx2="dk2" accent1="accent1" accent2="accent2" accent3="accent3" accent4="accent4" accent5="accent5" accent6="accent6" hlink="hlink" folHlink="folHlink"/>
   </p:clrMapOvr>
-  <mc:AlternateContent xmlns:mc="http://schemas.openxmlformats.org/markup-compatibility/2006">
-    <mc:Choice xmlns:p14="http://schemas.microsoft.com/office/powerpoint/2010/main" Requires="p14">
+  <mc:AlternateContent xmlns:mc="http://schemas.openxmlformats.org/markup-compatibility/2006" xmlns:p14="http://schemas.microsoft.com/office/powerpoint/2010/main">
+    <mc:Choice Requires="p14">
       <p:transition spd="med" p14:dur="700">
         <p:fade/>
       </p:transition>
     </mc:Choice>
-    <mc:Fallback>
+    <mc:Fallback xmlns="">
       <p:transition spd="med">
         <p:fade/>
       </p:transition>
@@ -13049,13 +13908,13 @@
   <p:clrMapOvr>
     <a:overrideClrMapping bg1="lt1" tx1="dk1" bg2="lt2" tx2="dk2" accent1="accent1" accent2="accent2" accent3="accent3" accent4="accent4" accent5="accent5" accent6="accent6" hlink="hlink" folHlink="folHlink"/>
   </p:clrMapOvr>
-  <mc:AlternateContent xmlns:mc="http://schemas.openxmlformats.org/markup-compatibility/2006">
-    <mc:Choice xmlns:p14="http://schemas.microsoft.com/office/powerpoint/2010/main" Requires="p14">
+  <mc:AlternateContent xmlns:mc="http://schemas.openxmlformats.org/markup-compatibility/2006" xmlns:p14="http://schemas.microsoft.com/office/powerpoint/2010/main">
+    <mc:Choice Requires="p14">
       <p:transition spd="med" p14:dur="700">
         <p:fade/>
       </p:transition>
     </mc:Choice>
-    <mc:Fallback>
+    <mc:Fallback xmlns="">
       <p:transition spd="med">
         <p:fade/>
       </p:transition>
@@ -14133,13 +14992,13 @@
   <p:clrMapOvr>
     <a:overrideClrMapping bg1="lt1" tx1="dk1" bg2="lt2" tx2="dk2" accent1="accent1" accent2="accent2" accent3="accent3" accent4="accent4" accent5="accent5" accent6="accent6" hlink="hlink" folHlink="folHlink"/>
   </p:clrMapOvr>
-  <mc:AlternateContent xmlns:mc="http://schemas.openxmlformats.org/markup-compatibility/2006">
-    <mc:Choice xmlns:p14="http://schemas.microsoft.com/office/powerpoint/2010/main" Requires="p14">
+  <mc:AlternateContent xmlns:mc="http://schemas.openxmlformats.org/markup-compatibility/2006" xmlns:p14="http://schemas.microsoft.com/office/powerpoint/2010/main">
+    <mc:Choice Requires="p14">
       <p:transition spd="med" p14:dur="700">
         <p:fade/>
       </p:transition>
     </mc:Choice>
-    <mc:Fallback>
+    <mc:Fallback xmlns="">
       <p:transition spd="med">
         <p:fade/>
       </p:transition>
@@ -14689,13 +15548,13 @@
   <p:clrMapOvr>
     <a:overrideClrMapping bg1="lt1" tx1="dk1" bg2="lt2" tx2="dk2" accent1="accent1" accent2="accent2" accent3="accent3" accent4="accent4" accent5="accent5" accent6="accent6" hlink="hlink" folHlink="folHlink"/>
   </p:clrMapOvr>
-  <mc:AlternateContent xmlns:mc="http://schemas.openxmlformats.org/markup-compatibility/2006">
-    <mc:Choice xmlns:p14="http://schemas.microsoft.com/office/powerpoint/2010/main" Requires="p14">
+  <mc:AlternateContent xmlns:mc="http://schemas.openxmlformats.org/markup-compatibility/2006" xmlns:p14="http://schemas.microsoft.com/office/powerpoint/2010/main">
+    <mc:Choice Requires="p14">
       <p:transition spd="med" p14:dur="700">
         <p:fade/>
       </p:transition>
     </mc:Choice>
-    <mc:Fallback>
+    <mc:Fallback xmlns="">
       <p:transition spd="med">
         <p:fade/>
       </p:transition>
@@ -15416,13 +16275,13 @@
   <p:clrMapOvr>
     <a:overrideClrMapping bg1="lt1" tx1="dk1" bg2="lt2" tx2="dk2" accent1="accent1" accent2="accent2" accent3="accent3" accent4="accent4" accent5="accent5" accent6="accent6" hlink="hlink" folHlink="folHlink"/>
   </p:clrMapOvr>
-  <mc:AlternateContent xmlns:mc="http://schemas.openxmlformats.org/markup-compatibility/2006">
-    <mc:Choice xmlns:p14="http://schemas.microsoft.com/office/powerpoint/2010/main" Requires="p14">
+  <mc:AlternateContent xmlns:mc="http://schemas.openxmlformats.org/markup-compatibility/2006" xmlns:p14="http://schemas.microsoft.com/office/powerpoint/2010/main">
+    <mc:Choice Requires="p14">
       <p:transition spd="med" p14:dur="700">
         <p:fade/>
       </p:transition>
     </mc:Choice>
-    <mc:Fallback>
+    <mc:Fallback xmlns="">
       <p:transition spd="med">
         <p:fade/>
       </p:transition>
@@ -16661,13 +17520,13 @@
   <p:clrMapOvr>
     <a:overrideClrMapping bg1="lt1" tx1="dk1" bg2="lt2" tx2="dk2" accent1="accent1" accent2="accent2" accent3="accent3" accent4="accent4" accent5="accent5" accent6="accent6" hlink="hlink" folHlink="folHlink"/>
   </p:clrMapOvr>
-  <mc:AlternateContent xmlns:mc="http://schemas.openxmlformats.org/markup-compatibility/2006">
-    <mc:Choice xmlns:p14="http://schemas.microsoft.com/office/powerpoint/2010/main" Requires="p14">
+  <mc:AlternateContent xmlns:mc="http://schemas.openxmlformats.org/markup-compatibility/2006" xmlns:p14="http://schemas.microsoft.com/office/powerpoint/2010/main">
+    <mc:Choice Requires="p14">
       <p:transition spd="med" p14:dur="700">
         <p:fade/>
       </p:transition>
     </mc:Choice>
-    <mc:Fallback>
+    <mc:Fallback xmlns="">
       <p:transition spd="med">
         <p:fade/>
       </p:transition>
@@ -17725,6 +18584,49 @@
 </a:themeOverride>
 </file>
 
+<file path=ppt/theme/themeOverride12.xml><?xml version="1.0" encoding="utf-8"?>
+<a:themeOverride xmlns:a="http://schemas.openxmlformats.org/drawingml/2006/main">
+  <a:clrScheme name="AnalogousFromRegularSeedRightStep">
+    <a:dk1>
+      <a:srgbClr val="000000"/>
+    </a:dk1>
+    <a:lt1>
+      <a:srgbClr val="FFFFFF"/>
+    </a:lt1>
+    <a:dk2>
+      <a:srgbClr val="3C3522"/>
+    </a:dk2>
+    <a:lt2>
+      <a:srgbClr val="E2E6E8"/>
+    </a:lt2>
+    <a:accent1>
+      <a:srgbClr val="C3704D"/>
+    </a:accent1>
+    <a:accent2>
+      <a:srgbClr val="B1903B"/>
+    </a:accent2>
+    <a:accent3>
+      <a:srgbClr val="9DAB43"/>
+    </a:accent3>
+    <a:accent4>
+      <a:srgbClr val="70B13B"/>
+    </a:accent4>
+    <a:accent5>
+      <a:srgbClr val="4CB748"/>
+    </a:accent5>
+    <a:accent6>
+      <a:srgbClr val="3BB168"/>
+    </a:accent6>
+    <a:hlink>
+      <a:srgbClr val="3A8BAE"/>
+    </a:hlink>
+    <a:folHlink>
+      <a:srgbClr val="7F7F7F"/>
+    </a:folHlink>
+  </a:clrScheme>
+</a:themeOverride>
+</file>
+
 <file path=ppt/theme/themeOverride2.xml><?xml version="1.0" encoding="utf-8"?>
 <a:themeOverride xmlns:a="http://schemas.openxmlformats.org/drawingml/2006/main">
   <a:clrScheme name="AnalogousFromRegularSeedRightStep">

</xml_diff>